<commit_message>
End of flight slides
</commit_message>
<xml_diff>
--- a/Amgen_Dash_Slides.pptx
+++ b/Amgen_Dash_Slides.pptx
@@ -5,7 +5,7 @@
     <p:sldMasterId id="2147484670" r:id="rId1"/>
   </p:sldMasterIdLst>
   <p:notesMasterIdLst>
-    <p:notesMasterId r:id="rId32"/>
+    <p:notesMasterId r:id="rId36"/>
   </p:notesMasterIdLst>
   <p:sldIdLst>
     <p:sldId id="256" r:id="rId2"/>
@@ -33,11 +33,15 @@
     <p:sldId id="269" r:id="rId24"/>
     <p:sldId id="286" r:id="rId25"/>
     <p:sldId id="270" r:id="rId26"/>
-    <p:sldId id="271" r:id="rId27"/>
-    <p:sldId id="273" r:id="rId28"/>
-    <p:sldId id="272" r:id="rId29"/>
-    <p:sldId id="274" r:id="rId30"/>
-    <p:sldId id="277" r:id="rId31"/>
+    <p:sldId id="287" r:id="rId27"/>
+    <p:sldId id="271" r:id="rId28"/>
+    <p:sldId id="288" r:id="rId29"/>
+    <p:sldId id="273" r:id="rId30"/>
+    <p:sldId id="272" r:id="rId31"/>
+    <p:sldId id="277" r:id="rId32"/>
+    <p:sldId id="290" r:id="rId33"/>
+    <p:sldId id="289" r:id="rId34"/>
+    <p:sldId id="274" r:id="rId35"/>
   </p:sldIdLst>
   <p:sldSz cx="12192000" cy="6858000"/>
   <p:notesSz cx="6858000" cy="9144000"/>
@@ -651,52 +655,51 @@
           <a:bodyPr/>
           <a:lstStyle/>
           <a:p>
-            <a:pPr marL="228600" indent="-228600">
-              <a:buAutoNum type="arabicPeriod"/>
-            </a:pPr>
-            <a:r>
-              <a:rPr lang="en-US" dirty="0"/>
-              <a:t>Generates a table from a </a:t>
-            </a:r>
-            <a:r>
-              <a:rPr lang="en-US" dirty="0" err="1"/>
-              <a:t>dataframe</a:t>
-            </a:r>
-            <a:endParaRPr lang="en-US" dirty="0"/>
-          </a:p>
-          <a:p>
-            <a:pPr marL="228600" indent="-228600">
-              <a:buAutoNum type="arabicPeriod"/>
-            </a:pPr>
-            <a:endParaRPr lang="en-US" dirty="0"/>
-          </a:p>
-          <a:p>
-            <a:pPr marL="228600" indent="-228600">
-              <a:buAutoNum type="arabicPeriod"/>
-            </a:pPr>
-            <a:r>
-              <a:rPr lang="en-US" dirty="0"/>
-              <a:t>Graph makes use of </a:t>
-            </a:r>
-            <a:r>
-              <a:rPr lang="en-US" dirty="0" err="1"/>
-              <a:t>plotly.graph_objs</a:t>
-            </a:r>
-            <a:endParaRPr lang="en-US" dirty="0"/>
-          </a:p>
-          <a:p>
-            <a:pPr marL="228600" indent="-228600">
-              <a:buAutoNum type="arabicPeriod"/>
-            </a:pPr>
-            <a:endParaRPr lang="en-US" dirty="0"/>
-          </a:p>
-          <a:p>
-            <a:pPr marL="228600" indent="-228600">
-              <a:buAutoNum type="arabicPeriod"/>
-            </a:pPr>
-            <a:r>
-              <a:rPr lang="en-US" dirty="0"/>
-              <a:t>Just some common examples</a:t>
+            <a:r>
+              <a:rPr lang="en-US" dirty="0"/>
+              <a:t>Pattern:</a:t>
+            </a:r>
+          </a:p>
+          <a:p>
+            <a:r>
+              <a:rPr lang="en-US" dirty="0"/>
+              <a:t>1) Here is the concept</a:t>
+            </a:r>
+          </a:p>
+          <a:p>
+            <a:r>
+              <a:rPr lang="en-US" dirty="0"/>
+              <a:t>2) Here is the code</a:t>
+            </a:r>
+          </a:p>
+          <a:p>
+            <a:r>
+              <a:rPr lang="en-US" dirty="0"/>
+              <a:t>3) What do you think it will do?</a:t>
+            </a:r>
+          </a:p>
+          <a:p>
+            <a:r>
+              <a:rPr lang="en-US" dirty="0"/>
+              <a:t>4) Run it to see what it does</a:t>
+            </a:r>
+          </a:p>
+          <a:p>
+            <a:r>
+              <a:rPr lang="en-US" dirty="0"/>
+              <a:t>5) How did it do that?</a:t>
+            </a:r>
+          </a:p>
+          <a:p>
+            <a:endParaRPr lang="en-US" dirty="0"/>
+          </a:p>
+          <a:p>
+            <a:endParaRPr lang="en-US" dirty="0"/>
+          </a:p>
+          <a:p>
+            <a:r>
+              <a:rPr lang="en-US" dirty="0"/>
+              <a:t>I believe you learned about React this week so this should sound familiar</a:t>
             </a:r>
           </a:p>
         </p:txBody>
@@ -718,7 +721,7 @@
           <a:p>
             <a:fld id="{8B9E4114-3C63-7747-8961-9652315A5F8D}" type="slidenum">
               <a:rPr lang="en-US" smtClean="0"/>
-              <a:t>18</a:t>
+              <a:t>15</a:t>
             </a:fld>
             <a:endParaRPr lang="en-US"/>
           </a:p>
@@ -727,7 +730,7 @@
     </p:spTree>
     <p:extLst>
       <p:ext uri="{BB962C8B-B14F-4D97-AF65-F5344CB8AC3E}">
-        <p14:creationId xmlns:p14="http://schemas.microsoft.com/office/powerpoint/2010/main" val="2124136524"/>
+        <p14:creationId xmlns:p14="http://schemas.microsoft.com/office/powerpoint/2010/main" val="2370781854"/>
       </p:ext>
     </p:extLst>
   </p:cSld>
@@ -819,193 +822,6 @@
           <a:p>
             <a:endParaRPr lang="en-US" dirty="0"/>
           </a:p>
-          <a:p>
-            <a:pPr marL="228600" marR="0" lvl="0" indent="-228600" algn="l" defTabSz="914400" rtl="0" eaLnBrk="1" fontAlgn="auto" latinLnBrk="0" hangingPunct="1">
-              <a:lnSpc>
-                <a:spcPct val="100000"/>
-              </a:lnSpc>
-              <a:spcBef>
-                <a:spcPts val="0"/>
-              </a:spcBef>
-              <a:spcAft>
-                <a:spcPts val="0"/>
-              </a:spcAft>
-              <a:buClrTx/>
-              <a:buSzTx/>
-              <a:buFontTx/>
-              <a:buAutoNum type="arabicParenR"/>
-              <a:tabLst/>
-              <a:defRPr/>
-            </a:pPr>
-            <a:r>
-              <a:rPr lang="en-US" sz="1200" b="0" i="0" kern="1200" dirty="0">
-                <a:solidFill>
-                  <a:schemeClr val="tx1"/>
-                </a:solidFill>
-                <a:effectLst/>
-                <a:latin typeface="+mn-lt"/>
-                <a:ea typeface="+mn-ea"/>
-                <a:cs typeface="+mn-cs"/>
-              </a:rPr>
-              <a:t>The "inputs" and "outputs" of our application interface are described declaratively through the </a:t>
-            </a:r>
-            <a:r>
-              <a:rPr lang="en-US" sz="1200" b="0" i="0" kern="1200" dirty="0" err="1">
-                <a:solidFill>
-                  <a:schemeClr val="tx1"/>
-                </a:solidFill>
-                <a:effectLst/>
-                <a:latin typeface="+mn-lt"/>
-                <a:ea typeface="+mn-ea"/>
-                <a:cs typeface="+mn-cs"/>
-              </a:rPr>
-              <a:t>app.callback</a:t>
-            </a:r>
-            <a:r>
-              <a:rPr lang="en-US" sz="1200" b="0" i="0" kern="1200" dirty="0">
-                <a:solidFill>
-                  <a:schemeClr val="tx1"/>
-                </a:solidFill>
-                <a:effectLst/>
-                <a:latin typeface="+mn-lt"/>
-                <a:ea typeface="+mn-ea"/>
-                <a:cs typeface="+mn-cs"/>
-              </a:rPr>
-              <a:t> decorator.</a:t>
-            </a:r>
-          </a:p>
-          <a:p>
-            <a:pPr marL="228600" marR="0" lvl="0" indent="-228600" algn="l" defTabSz="914400" rtl="0" eaLnBrk="1" fontAlgn="auto" latinLnBrk="0" hangingPunct="1">
-              <a:lnSpc>
-                <a:spcPct val="100000"/>
-              </a:lnSpc>
-              <a:spcBef>
-                <a:spcPts val="0"/>
-              </a:spcBef>
-              <a:spcAft>
-                <a:spcPts val="0"/>
-              </a:spcAft>
-              <a:buClrTx/>
-              <a:buSzTx/>
-              <a:buFontTx/>
-              <a:buAutoNum type="arabicParenR"/>
-              <a:tabLst/>
-              <a:defRPr/>
-            </a:pPr>
-            <a:r>
-              <a:rPr lang="en-US" sz="1200" b="0" i="0" kern="1200" dirty="0">
-                <a:solidFill>
-                  <a:schemeClr val="tx1"/>
-                </a:solidFill>
-                <a:effectLst/>
-                <a:latin typeface="+mn-lt"/>
-                <a:ea typeface="+mn-ea"/>
-                <a:cs typeface="+mn-cs"/>
-              </a:rPr>
-              <a:t>In Dash, the inputs and outputs of our application are simply the properties of a particular component. In this example, our input is the "</a:t>
-            </a:r>
-            <a:r>
-              <a:rPr lang="en-US" dirty="0"/>
-              <a:t>value</a:t>
-            </a:r>
-            <a:r>
-              <a:rPr lang="en-US" sz="1200" b="0" i="0" kern="1200" dirty="0">
-                <a:solidFill>
-                  <a:schemeClr val="tx1"/>
-                </a:solidFill>
-                <a:effectLst/>
-                <a:latin typeface="+mn-lt"/>
-                <a:ea typeface="+mn-ea"/>
-                <a:cs typeface="+mn-cs"/>
-              </a:rPr>
-              <a:t>" property of the component that has the ID "</a:t>
-            </a:r>
-            <a:r>
-              <a:rPr lang="en-US" dirty="0"/>
-              <a:t>my-id</a:t>
-            </a:r>
-            <a:r>
-              <a:rPr lang="en-US" sz="1200" b="0" i="0" kern="1200" dirty="0">
-                <a:solidFill>
-                  <a:schemeClr val="tx1"/>
-                </a:solidFill>
-                <a:effectLst/>
-                <a:latin typeface="+mn-lt"/>
-                <a:ea typeface="+mn-ea"/>
-                <a:cs typeface="+mn-cs"/>
-              </a:rPr>
-              <a:t>". Our output is the "</a:t>
-            </a:r>
-            <a:r>
-              <a:rPr lang="en-US" dirty="0"/>
-              <a:t>children</a:t>
-            </a:r>
-            <a:r>
-              <a:rPr lang="en-US" sz="1200" b="0" i="0" kern="1200" dirty="0">
-                <a:solidFill>
-                  <a:schemeClr val="tx1"/>
-                </a:solidFill>
-                <a:effectLst/>
-                <a:latin typeface="+mn-lt"/>
-                <a:ea typeface="+mn-ea"/>
-                <a:cs typeface="+mn-cs"/>
-              </a:rPr>
-              <a:t>" property of the component with the ID "</a:t>
-            </a:r>
-            <a:r>
-              <a:rPr lang="en-US" dirty="0"/>
-              <a:t>my-div</a:t>
-            </a:r>
-            <a:r>
-              <a:rPr lang="en-US" sz="1200" b="0" i="0" kern="1200" dirty="0">
-                <a:solidFill>
-                  <a:schemeClr val="tx1"/>
-                </a:solidFill>
-                <a:effectLst/>
-                <a:latin typeface="+mn-lt"/>
-                <a:ea typeface="+mn-ea"/>
-                <a:cs typeface="+mn-cs"/>
-              </a:rPr>
-              <a:t>”</a:t>
-            </a:r>
-          </a:p>
-          <a:p>
-            <a:pPr marL="228600" marR="0" lvl="0" indent="-228600" algn="l" defTabSz="914400" rtl="0" eaLnBrk="1" fontAlgn="auto" latinLnBrk="0" hangingPunct="1">
-              <a:lnSpc>
-                <a:spcPct val="100000"/>
-              </a:lnSpc>
-              <a:spcBef>
-                <a:spcPts val="0"/>
-              </a:spcBef>
-              <a:spcAft>
-                <a:spcPts val="0"/>
-              </a:spcAft>
-              <a:buClrTx/>
-              <a:buSzTx/>
-              <a:buFontTx/>
-              <a:buAutoNum type="arabicParenR"/>
-              <a:tabLst/>
-              <a:defRPr/>
-            </a:pPr>
-            <a:r>
-              <a:rPr lang="en-US" sz="1200" b="0" i="0" kern="1200" dirty="0">
-                <a:solidFill>
-                  <a:schemeClr val="tx1"/>
-                </a:solidFill>
-                <a:effectLst/>
-                <a:latin typeface="+mn-lt"/>
-                <a:ea typeface="+mn-ea"/>
-                <a:cs typeface="+mn-cs"/>
-              </a:rPr>
-              <a:t>Whenever an input property changes, the function that the callback decorator wraps will get called automatically. Dash provides the function with the new value of the input property as an input argument and Dash updates the property of the output component with whatever was returned by the function.</a:t>
-            </a:r>
-          </a:p>
-          <a:p>
-            <a:endParaRPr lang="en-US" dirty="0"/>
-          </a:p>
-          <a:p>
-            <a:endParaRPr lang="en-US" dirty="0"/>
-          </a:p>
         </p:txBody>
       </p:sp>
       <p:sp>
@@ -1025,7 +841,7 @@
           <a:p>
             <a:fld id="{8B9E4114-3C63-7747-8961-9652315A5F8D}" type="slidenum">
               <a:rPr lang="en-US" smtClean="0"/>
-              <a:t>19</a:t>
+              <a:t>17</a:t>
             </a:fld>
             <a:endParaRPr lang="en-US"/>
           </a:p>
@@ -1034,7 +850,7 @@
     </p:spTree>
     <p:extLst>
       <p:ext uri="{BB962C8B-B14F-4D97-AF65-F5344CB8AC3E}">
-        <p14:creationId xmlns:p14="http://schemas.microsoft.com/office/powerpoint/2010/main" val="319211112"/>
+        <p14:creationId xmlns:p14="http://schemas.microsoft.com/office/powerpoint/2010/main" val="1864368416"/>
       </p:ext>
     </p:extLst>
   </p:cSld>
@@ -1124,7 +940,59 @@
             </a:r>
           </a:p>
           <a:p>
-            <a:endParaRPr lang="en-US" dirty="0"/>
+            <a:pPr marL="228600" indent="-228600">
+              <a:buAutoNum type="arabicPeriod"/>
+            </a:pPr>
+            <a:endParaRPr lang="en-US" dirty="0"/>
+          </a:p>
+          <a:p>
+            <a:pPr marL="228600" indent="-228600">
+              <a:buAutoNum type="arabicPeriod"/>
+            </a:pPr>
+            <a:r>
+              <a:rPr lang="en-US" dirty="0"/>
+              <a:t>Generates a table from a </a:t>
+            </a:r>
+            <a:r>
+              <a:rPr lang="en-US" dirty="0" err="1"/>
+              <a:t>dataframe</a:t>
+            </a:r>
+            <a:endParaRPr lang="en-US" dirty="0"/>
+          </a:p>
+          <a:p>
+            <a:pPr marL="228600" indent="-228600">
+              <a:buAutoNum type="arabicPeriod"/>
+            </a:pPr>
+            <a:endParaRPr lang="en-US" dirty="0"/>
+          </a:p>
+          <a:p>
+            <a:pPr marL="228600" indent="-228600">
+              <a:buAutoNum type="arabicPeriod"/>
+            </a:pPr>
+            <a:r>
+              <a:rPr lang="en-US" dirty="0"/>
+              <a:t>Graph makes use of </a:t>
+            </a:r>
+            <a:r>
+              <a:rPr lang="en-US" dirty="0" err="1"/>
+              <a:t>plotly.graph_objs</a:t>
+            </a:r>
+            <a:endParaRPr lang="en-US" dirty="0"/>
+          </a:p>
+          <a:p>
+            <a:pPr marL="228600" indent="-228600">
+              <a:buAutoNum type="arabicPeriod"/>
+            </a:pPr>
+            <a:endParaRPr lang="en-US" dirty="0"/>
+          </a:p>
+          <a:p>
+            <a:pPr marL="228600" indent="-228600">
+              <a:buAutoNum type="arabicPeriod"/>
+            </a:pPr>
+            <a:r>
+              <a:rPr lang="en-US" dirty="0"/>
+              <a:t>Just some common examples</a:t>
+            </a:r>
           </a:p>
         </p:txBody>
       </p:sp>
@@ -1145,7 +1013,7 @@
           <a:p>
             <a:fld id="{8B9E4114-3C63-7747-8961-9652315A5F8D}" type="slidenum">
               <a:rPr lang="en-US" smtClean="0"/>
-              <a:t>23</a:t>
+              <a:t>18</a:t>
             </a:fld>
             <a:endParaRPr lang="en-US"/>
           </a:p>
@@ -1154,7 +1022,7 @@
     </p:spTree>
     <p:extLst>
       <p:ext uri="{BB962C8B-B14F-4D97-AF65-F5344CB8AC3E}">
-        <p14:creationId xmlns:p14="http://schemas.microsoft.com/office/powerpoint/2010/main" val="2098786567"/>
+        <p14:creationId xmlns:p14="http://schemas.microsoft.com/office/powerpoint/2010/main" val="2124136524"/>
       </p:ext>
     </p:extLst>
   </p:cSld>
@@ -1246,6 +1114,193 @@
           <a:p>
             <a:endParaRPr lang="en-US" dirty="0"/>
           </a:p>
+          <a:p>
+            <a:pPr marL="228600" marR="0" lvl="0" indent="-228600" algn="l" defTabSz="914400" rtl="0" eaLnBrk="1" fontAlgn="auto" latinLnBrk="0" hangingPunct="1">
+              <a:lnSpc>
+                <a:spcPct val="100000"/>
+              </a:lnSpc>
+              <a:spcBef>
+                <a:spcPts val="0"/>
+              </a:spcBef>
+              <a:spcAft>
+                <a:spcPts val="0"/>
+              </a:spcAft>
+              <a:buClrTx/>
+              <a:buSzTx/>
+              <a:buFontTx/>
+              <a:buAutoNum type="arabicParenR"/>
+              <a:tabLst/>
+              <a:defRPr/>
+            </a:pPr>
+            <a:r>
+              <a:rPr lang="en-US" sz="1200" b="0" i="0" kern="1200" dirty="0">
+                <a:solidFill>
+                  <a:schemeClr val="tx1"/>
+                </a:solidFill>
+                <a:effectLst/>
+                <a:latin typeface="+mn-lt"/>
+                <a:ea typeface="+mn-ea"/>
+                <a:cs typeface="+mn-cs"/>
+              </a:rPr>
+              <a:t>The "inputs" and "outputs" of our application interface are described declaratively through the </a:t>
+            </a:r>
+            <a:r>
+              <a:rPr lang="en-US" sz="1200" b="0" i="0" kern="1200" dirty="0" err="1">
+                <a:solidFill>
+                  <a:schemeClr val="tx1"/>
+                </a:solidFill>
+                <a:effectLst/>
+                <a:latin typeface="+mn-lt"/>
+                <a:ea typeface="+mn-ea"/>
+                <a:cs typeface="+mn-cs"/>
+              </a:rPr>
+              <a:t>app.callback</a:t>
+            </a:r>
+            <a:r>
+              <a:rPr lang="en-US" sz="1200" b="0" i="0" kern="1200" dirty="0">
+                <a:solidFill>
+                  <a:schemeClr val="tx1"/>
+                </a:solidFill>
+                <a:effectLst/>
+                <a:latin typeface="+mn-lt"/>
+                <a:ea typeface="+mn-ea"/>
+                <a:cs typeface="+mn-cs"/>
+              </a:rPr>
+              <a:t> decorator.</a:t>
+            </a:r>
+          </a:p>
+          <a:p>
+            <a:pPr marL="228600" marR="0" lvl="0" indent="-228600" algn="l" defTabSz="914400" rtl="0" eaLnBrk="1" fontAlgn="auto" latinLnBrk="0" hangingPunct="1">
+              <a:lnSpc>
+                <a:spcPct val="100000"/>
+              </a:lnSpc>
+              <a:spcBef>
+                <a:spcPts val="0"/>
+              </a:spcBef>
+              <a:spcAft>
+                <a:spcPts val="0"/>
+              </a:spcAft>
+              <a:buClrTx/>
+              <a:buSzTx/>
+              <a:buFontTx/>
+              <a:buAutoNum type="arabicParenR"/>
+              <a:tabLst/>
+              <a:defRPr/>
+            </a:pPr>
+            <a:r>
+              <a:rPr lang="en-US" sz="1200" b="0" i="0" kern="1200" dirty="0">
+                <a:solidFill>
+                  <a:schemeClr val="tx1"/>
+                </a:solidFill>
+                <a:effectLst/>
+                <a:latin typeface="+mn-lt"/>
+                <a:ea typeface="+mn-ea"/>
+                <a:cs typeface="+mn-cs"/>
+              </a:rPr>
+              <a:t>In Dash, the inputs and outputs of our application are simply the properties of a particular component. In this example, our input is the "</a:t>
+            </a:r>
+            <a:r>
+              <a:rPr lang="en-US" dirty="0"/>
+              <a:t>value</a:t>
+            </a:r>
+            <a:r>
+              <a:rPr lang="en-US" sz="1200" b="0" i="0" kern="1200" dirty="0">
+                <a:solidFill>
+                  <a:schemeClr val="tx1"/>
+                </a:solidFill>
+                <a:effectLst/>
+                <a:latin typeface="+mn-lt"/>
+                <a:ea typeface="+mn-ea"/>
+                <a:cs typeface="+mn-cs"/>
+              </a:rPr>
+              <a:t>" property of the component that has the ID "</a:t>
+            </a:r>
+            <a:r>
+              <a:rPr lang="en-US" dirty="0"/>
+              <a:t>my-id</a:t>
+            </a:r>
+            <a:r>
+              <a:rPr lang="en-US" sz="1200" b="0" i="0" kern="1200" dirty="0">
+                <a:solidFill>
+                  <a:schemeClr val="tx1"/>
+                </a:solidFill>
+                <a:effectLst/>
+                <a:latin typeface="+mn-lt"/>
+                <a:ea typeface="+mn-ea"/>
+                <a:cs typeface="+mn-cs"/>
+              </a:rPr>
+              <a:t>". Our output is the "</a:t>
+            </a:r>
+            <a:r>
+              <a:rPr lang="en-US" dirty="0"/>
+              <a:t>children</a:t>
+            </a:r>
+            <a:r>
+              <a:rPr lang="en-US" sz="1200" b="0" i="0" kern="1200" dirty="0">
+                <a:solidFill>
+                  <a:schemeClr val="tx1"/>
+                </a:solidFill>
+                <a:effectLst/>
+                <a:latin typeface="+mn-lt"/>
+                <a:ea typeface="+mn-ea"/>
+                <a:cs typeface="+mn-cs"/>
+              </a:rPr>
+              <a:t>" property of the component with the ID "</a:t>
+            </a:r>
+            <a:r>
+              <a:rPr lang="en-US" dirty="0"/>
+              <a:t>my-div</a:t>
+            </a:r>
+            <a:r>
+              <a:rPr lang="en-US" sz="1200" b="0" i="0" kern="1200" dirty="0">
+                <a:solidFill>
+                  <a:schemeClr val="tx1"/>
+                </a:solidFill>
+                <a:effectLst/>
+                <a:latin typeface="+mn-lt"/>
+                <a:ea typeface="+mn-ea"/>
+                <a:cs typeface="+mn-cs"/>
+              </a:rPr>
+              <a:t>”</a:t>
+            </a:r>
+          </a:p>
+          <a:p>
+            <a:pPr marL="228600" marR="0" lvl="0" indent="-228600" algn="l" defTabSz="914400" rtl="0" eaLnBrk="1" fontAlgn="auto" latinLnBrk="0" hangingPunct="1">
+              <a:lnSpc>
+                <a:spcPct val="100000"/>
+              </a:lnSpc>
+              <a:spcBef>
+                <a:spcPts val="0"/>
+              </a:spcBef>
+              <a:spcAft>
+                <a:spcPts val="0"/>
+              </a:spcAft>
+              <a:buClrTx/>
+              <a:buSzTx/>
+              <a:buFontTx/>
+              <a:buAutoNum type="arabicParenR"/>
+              <a:tabLst/>
+              <a:defRPr/>
+            </a:pPr>
+            <a:r>
+              <a:rPr lang="en-US" sz="1200" b="0" i="0" kern="1200" dirty="0">
+                <a:solidFill>
+                  <a:schemeClr val="tx1"/>
+                </a:solidFill>
+                <a:effectLst/>
+                <a:latin typeface="+mn-lt"/>
+                <a:ea typeface="+mn-ea"/>
+                <a:cs typeface="+mn-cs"/>
+              </a:rPr>
+              <a:t>Whenever an input property changes, the function that the callback decorator wraps will get called automatically. Dash provides the function with the new value of the input property as an input argument and Dash updates the property of the output component with whatever was returned by the function.</a:t>
+            </a:r>
+          </a:p>
+          <a:p>
+            <a:endParaRPr lang="en-US" dirty="0"/>
+          </a:p>
+          <a:p>
+            <a:endParaRPr lang="en-US" dirty="0"/>
+          </a:p>
         </p:txBody>
       </p:sp>
       <p:sp>
@@ -1265,7 +1320,7 @@
           <a:p>
             <a:fld id="{8B9E4114-3C63-7747-8961-9652315A5F8D}" type="slidenum">
               <a:rPr lang="en-US" smtClean="0"/>
-              <a:t>25</a:t>
+              <a:t>19</a:t>
             </a:fld>
             <a:endParaRPr lang="en-US"/>
           </a:p>
@@ -1274,7 +1329,7 @@
     </p:spTree>
     <p:extLst>
       <p:ext uri="{BB962C8B-B14F-4D97-AF65-F5344CB8AC3E}">
-        <p14:creationId xmlns:p14="http://schemas.microsoft.com/office/powerpoint/2010/main" val="853544838"/>
+        <p14:creationId xmlns:p14="http://schemas.microsoft.com/office/powerpoint/2010/main" val="319211112"/>
       </p:ext>
     </p:extLst>
   </p:cSld>
@@ -1385,7 +1440,7 @@
           <a:p>
             <a:fld id="{8B9E4114-3C63-7747-8961-9652315A5F8D}" type="slidenum">
               <a:rPr lang="en-US" smtClean="0"/>
-              <a:t>26</a:t>
+              <a:t>20</a:t>
             </a:fld>
             <a:endParaRPr lang="en-US"/>
           </a:p>
@@ -1394,7 +1449,7 @@
     </p:spTree>
     <p:extLst>
       <p:ext uri="{BB962C8B-B14F-4D97-AF65-F5344CB8AC3E}">
-        <p14:creationId xmlns:p14="http://schemas.microsoft.com/office/powerpoint/2010/main" val="18317367"/>
+        <p14:creationId xmlns:p14="http://schemas.microsoft.com/office/powerpoint/2010/main" val="1265075627"/>
       </p:ext>
     </p:extLst>
   </p:cSld>
@@ -1450,102 +1505,41 @@
           <a:p>
             <a:r>
               <a:rPr lang="en-US" dirty="0"/>
-              <a:t>I was determined to run my app on a Source Notebook, despite the fact that Dash is not supported on </a:t>
-            </a:r>
-            <a:r>
-              <a:rPr lang="en-US" dirty="0" err="1"/>
-              <a:t>Jupyter</a:t>
-            </a:r>
-            <a:r>
-              <a:rPr lang="en-US" dirty="0"/>
-              <a:t> Notebooks </a:t>
-            </a:r>
-          </a:p>
-          <a:p>
-            <a:r>
-              <a:rPr lang="en-US" dirty="0"/>
-              <a:t>I succeeded and got some screenshots but since then it seems an update has broken it</a:t>
-            </a:r>
-          </a:p>
-          <a:p>
-            <a:r>
-              <a:rPr lang="en-US" dirty="0"/>
-              <a:t>So we’ll have to settle for the screenshots </a:t>
-            </a:r>
-          </a:p>
-          <a:p>
-            <a:endParaRPr lang="en-US" dirty="0"/>
-          </a:p>
-          <a:p>
-            <a:r>
-              <a:rPr lang="en-US" dirty="0"/>
-              <a:t>Open Source</a:t>
-            </a:r>
-          </a:p>
-          <a:p>
-            <a:r>
-              <a:rPr lang="en-US" dirty="0" err="1"/>
-              <a:t>Naviagate</a:t>
-            </a:r>
-            <a:r>
-              <a:rPr lang="en-US" dirty="0"/>
-              <a:t> to </a:t>
-            </a:r>
-            <a:r>
-              <a:rPr lang="en-US" dirty="0" err="1"/>
-              <a:t>Github</a:t>
-            </a:r>
-            <a:r>
-              <a:rPr lang="en-US" dirty="0"/>
-              <a:t> </a:t>
-            </a:r>
-          </a:p>
-          <a:p>
-            <a:r>
-              <a:rPr lang="en-US" dirty="0"/>
-              <a:t>Open </a:t>
-            </a:r>
-            <a:r>
-              <a:rPr lang="en-US" dirty="0" err="1"/>
-              <a:t>model.py</a:t>
-            </a:r>
-            <a:r>
-              <a:rPr lang="en-US" dirty="0"/>
-              <a:t> and </a:t>
-            </a:r>
-            <a:r>
-              <a:rPr lang="en-US" dirty="0" err="1"/>
-              <a:t>hightlight</a:t>
-            </a:r>
-            <a:r>
-              <a:rPr lang="en-US" dirty="0"/>
-              <a:t> model</a:t>
-            </a:r>
-          </a:p>
-          <a:p>
-            <a:r>
-              <a:rPr lang="en-US" dirty="0"/>
-              <a:t>Open visualizations and show NN architecture</a:t>
-            </a:r>
-          </a:p>
-          <a:p>
-            <a:r>
-              <a:rPr lang="en-US" dirty="0" err="1"/>
-              <a:t>README.md</a:t>
-            </a:r>
-            <a:endParaRPr lang="en-US" dirty="0"/>
-          </a:p>
-          <a:p>
-            <a:r>
-              <a:rPr lang="en-US" dirty="0"/>
-              <a:t>Open both images in separate tabs</a:t>
-            </a:r>
-          </a:p>
-          <a:p>
-            <a:r>
-              <a:rPr lang="en-US" dirty="0"/>
-              <a:t>Alternate back and forth between them</a:t>
-            </a:r>
+              <a:t>Pattern:</a:t>
+            </a:r>
+          </a:p>
+          <a:p>
+            <a:r>
+              <a:rPr lang="en-US" dirty="0"/>
+              <a:t>1) Here is the concept</a:t>
+            </a:r>
+          </a:p>
+          <a:p>
+            <a:r>
+              <a:rPr lang="en-US" dirty="0"/>
+              <a:t>2) Here is the code</a:t>
+            </a:r>
+          </a:p>
+          <a:p>
+            <a:r>
+              <a:rPr lang="en-US" dirty="0"/>
+              <a:t>3) What do you think it will do?</a:t>
+            </a:r>
+          </a:p>
+          <a:p>
+            <a:r>
+              <a:rPr lang="en-US" dirty="0"/>
+              <a:t>4) Run it to see what it does</a:t>
+            </a:r>
+          </a:p>
+          <a:p>
+            <a:r>
+              <a:rPr lang="en-US" dirty="0"/>
+              <a:t>5) How did it do that?</a:t>
+            </a:r>
+          </a:p>
+          <a:p>
+            <a:endParaRPr lang="en-US" dirty="0"/>
           </a:p>
         </p:txBody>
       </p:sp>
@@ -1566,7 +1560,7 @@
           <a:p>
             <a:fld id="{8B9E4114-3C63-7747-8961-9652315A5F8D}" type="slidenum">
               <a:rPr lang="en-US" smtClean="0"/>
-              <a:t>27</a:t>
+              <a:t>21</a:t>
             </a:fld>
             <a:endParaRPr lang="en-US"/>
           </a:p>
@@ -1575,7 +1569,487 @@
     </p:spTree>
     <p:extLst>
       <p:ext uri="{BB962C8B-B14F-4D97-AF65-F5344CB8AC3E}">
-        <p14:creationId xmlns:p14="http://schemas.microsoft.com/office/powerpoint/2010/main" val="3582251134"/>
+        <p14:creationId xmlns:p14="http://schemas.microsoft.com/office/powerpoint/2010/main" val="2123379793"/>
+      </p:ext>
+    </p:extLst>
+  </p:cSld>
+  <p:clrMapOvr>
+    <a:masterClrMapping/>
+  </p:clrMapOvr>
+</p:notes>
+</file>
+
+<file path=ppt/notesSlides/notesSlide16.xml><?xml version="1.0" encoding="utf-8"?>
+<p:notes xmlns:a="http://schemas.openxmlformats.org/drawingml/2006/main" xmlns:r="http://schemas.openxmlformats.org/officeDocument/2006/relationships" xmlns:p="http://schemas.openxmlformats.org/presentationml/2006/main">
+  <p:cSld>
+    <p:spTree>
+      <p:nvGrpSpPr>
+        <p:cNvPr id="1" name=""/>
+        <p:cNvGrpSpPr/>
+        <p:nvPr/>
+      </p:nvGrpSpPr>
+      <p:grpSpPr>
+        <a:xfrm>
+          <a:off x="0" y="0"/>
+          <a:ext cx="0" cy="0"/>
+          <a:chOff x="0" y="0"/>
+          <a:chExt cx="0" cy="0"/>
+        </a:xfrm>
+      </p:grpSpPr>
+      <p:sp>
+        <p:nvSpPr>
+          <p:cNvPr id="2" name="Slide Image Placeholder 1"/>
+          <p:cNvSpPr>
+            <a:spLocks noGrp="1" noRot="1" noChangeAspect="1"/>
+          </p:cNvSpPr>
+          <p:nvPr>
+            <p:ph type="sldImg"/>
+          </p:nvPr>
+        </p:nvSpPr>
+        <p:spPr/>
+      </p:sp>
+      <p:sp>
+        <p:nvSpPr>
+          <p:cNvPr id="3" name="Notes Placeholder 2"/>
+          <p:cNvSpPr>
+            <a:spLocks noGrp="1"/>
+          </p:cNvSpPr>
+          <p:nvPr>
+            <p:ph type="body" idx="1"/>
+          </p:nvPr>
+        </p:nvSpPr>
+        <p:spPr/>
+        <p:txBody>
+          <a:bodyPr/>
+          <a:lstStyle/>
+          <a:p>
+            <a:r>
+              <a:rPr lang="en-US" dirty="0"/>
+              <a:t>Pattern:</a:t>
+            </a:r>
+          </a:p>
+          <a:p>
+            <a:r>
+              <a:rPr lang="en-US" dirty="0"/>
+              <a:t>1) Here is the concept</a:t>
+            </a:r>
+          </a:p>
+          <a:p>
+            <a:r>
+              <a:rPr lang="en-US" dirty="0"/>
+              <a:t>2) Here is the code</a:t>
+            </a:r>
+          </a:p>
+          <a:p>
+            <a:r>
+              <a:rPr lang="en-US" dirty="0"/>
+              <a:t>3) What do you think it will do?</a:t>
+            </a:r>
+          </a:p>
+          <a:p>
+            <a:r>
+              <a:rPr lang="en-US" dirty="0"/>
+              <a:t>4) Run it to see what it does</a:t>
+            </a:r>
+          </a:p>
+          <a:p>
+            <a:r>
+              <a:rPr lang="en-US" dirty="0"/>
+              <a:t>5) How did it do that?</a:t>
+            </a:r>
+          </a:p>
+          <a:p>
+            <a:endParaRPr lang="en-US" dirty="0"/>
+          </a:p>
+        </p:txBody>
+      </p:sp>
+      <p:sp>
+        <p:nvSpPr>
+          <p:cNvPr id="4" name="Slide Number Placeholder 3"/>
+          <p:cNvSpPr>
+            <a:spLocks noGrp="1"/>
+          </p:cNvSpPr>
+          <p:nvPr>
+            <p:ph type="sldNum" sz="quarter" idx="5"/>
+          </p:nvPr>
+        </p:nvSpPr>
+        <p:spPr/>
+        <p:txBody>
+          <a:bodyPr/>
+          <a:lstStyle/>
+          <a:p>
+            <a:fld id="{8B9E4114-3C63-7747-8961-9652315A5F8D}" type="slidenum">
+              <a:rPr lang="en-US" smtClean="0"/>
+              <a:t>22</a:t>
+            </a:fld>
+            <a:endParaRPr lang="en-US"/>
+          </a:p>
+        </p:txBody>
+      </p:sp>
+    </p:spTree>
+    <p:extLst>
+      <p:ext uri="{BB962C8B-B14F-4D97-AF65-F5344CB8AC3E}">
+        <p14:creationId xmlns:p14="http://schemas.microsoft.com/office/powerpoint/2010/main" val="3913348965"/>
+      </p:ext>
+    </p:extLst>
+  </p:cSld>
+  <p:clrMapOvr>
+    <a:masterClrMapping/>
+  </p:clrMapOvr>
+</p:notes>
+</file>
+
+<file path=ppt/notesSlides/notesSlide17.xml><?xml version="1.0" encoding="utf-8"?>
+<p:notes xmlns:a="http://schemas.openxmlformats.org/drawingml/2006/main" xmlns:r="http://schemas.openxmlformats.org/officeDocument/2006/relationships" xmlns:p="http://schemas.openxmlformats.org/presentationml/2006/main">
+  <p:cSld>
+    <p:spTree>
+      <p:nvGrpSpPr>
+        <p:cNvPr id="1" name=""/>
+        <p:cNvGrpSpPr/>
+        <p:nvPr/>
+      </p:nvGrpSpPr>
+      <p:grpSpPr>
+        <a:xfrm>
+          <a:off x="0" y="0"/>
+          <a:ext cx="0" cy="0"/>
+          <a:chOff x="0" y="0"/>
+          <a:chExt cx="0" cy="0"/>
+        </a:xfrm>
+      </p:grpSpPr>
+      <p:sp>
+        <p:nvSpPr>
+          <p:cNvPr id="2" name="Slide Image Placeholder 1"/>
+          <p:cNvSpPr>
+            <a:spLocks noGrp="1" noRot="1" noChangeAspect="1"/>
+          </p:cNvSpPr>
+          <p:nvPr>
+            <p:ph type="sldImg"/>
+          </p:nvPr>
+        </p:nvSpPr>
+        <p:spPr/>
+      </p:sp>
+      <p:sp>
+        <p:nvSpPr>
+          <p:cNvPr id="3" name="Notes Placeholder 2"/>
+          <p:cNvSpPr>
+            <a:spLocks noGrp="1"/>
+          </p:cNvSpPr>
+          <p:nvPr>
+            <p:ph type="body" idx="1"/>
+          </p:nvPr>
+        </p:nvSpPr>
+        <p:spPr/>
+        <p:txBody>
+          <a:bodyPr/>
+          <a:lstStyle/>
+          <a:p>
+            <a:r>
+              <a:rPr lang="en-US" dirty="0"/>
+              <a:t>Pattern:</a:t>
+            </a:r>
+          </a:p>
+          <a:p>
+            <a:r>
+              <a:rPr lang="en-US" dirty="0"/>
+              <a:t>1) Here is the concept</a:t>
+            </a:r>
+          </a:p>
+          <a:p>
+            <a:r>
+              <a:rPr lang="en-US" dirty="0"/>
+              <a:t>2) Here is the code</a:t>
+            </a:r>
+          </a:p>
+          <a:p>
+            <a:r>
+              <a:rPr lang="en-US" dirty="0"/>
+              <a:t>3) What do you think it will do?</a:t>
+            </a:r>
+          </a:p>
+          <a:p>
+            <a:r>
+              <a:rPr lang="en-US" dirty="0"/>
+              <a:t>4) Run it to see what it does</a:t>
+            </a:r>
+          </a:p>
+          <a:p>
+            <a:r>
+              <a:rPr lang="en-US" dirty="0"/>
+              <a:t>5) How did it do that?</a:t>
+            </a:r>
+          </a:p>
+          <a:p>
+            <a:endParaRPr lang="en-US" dirty="0"/>
+          </a:p>
+        </p:txBody>
+      </p:sp>
+      <p:sp>
+        <p:nvSpPr>
+          <p:cNvPr id="4" name="Slide Number Placeholder 3"/>
+          <p:cNvSpPr>
+            <a:spLocks noGrp="1"/>
+          </p:cNvSpPr>
+          <p:nvPr>
+            <p:ph type="sldNum" sz="quarter" idx="5"/>
+          </p:nvPr>
+        </p:nvSpPr>
+        <p:spPr/>
+        <p:txBody>
+          <a:bodyPr/>
+          <a:lstStyle/>
+          <a:p>
+            <a:fld id="{8B9E4114-3C63-7747-8961-9652315A5F8D}" type="slidenum">
+              <a:rPr lang="en-US" smtClean="0"/>
+              <a:t>23</a:t>
+            </a:fld>
+            <a:endParaRPr lang="en-US"/>
+          </a:p>
+        </p:txBody>
+      </p:sp>
+    </p:spTree>
+    <p:extLst>
+      <p:ext uri="{BB962C8B-B14F-4D97-AF65-F5344CB8AC3E}">
+        <p14:creationId xmlns:p14="http://schemas.microsoft.com/office/powerpoint/2010/main" val="2098786567"/>
+      </p:ext>
+    </p:extLst>
+  </p:cSld>
+  <p:clrMapOvr>
+    <a:masterClrMapping/>
+  </p:clrMapOvr>
+</p:notes>
+</file>
+
+<file path=ppt/notesSlides/notesSlide18.xml><?xml version="1.0" encoding="utf-8"?>
+<p:notes xmlns:a="http://schemas.openxmlformats.org/drawingml/2006/main" xmlns:r="http://schemas.openxmlformats.org/officeDocument/2006/relationships" xmlns:p="http://schemas.openxmlformats.org/presentationml/2006/main">
+  <p:cSld>
+    <p:spTree>
+      <p:nvGrpSpPr>
+        <p:cNvPr id="1" name=""/>
+        <p:cNvGrpSpPr/>
+        <p:nvPr/>
+      </p:nvGrpSpPr>
+      <p:grpSpPr>
+        <a:xfrm>
+          <a:off x="0" y="0"/>
+          <a:ext cx="0" cy="0"/>
+          <a:chOff x="0" y="0"/>
+          <a:chExt cx="0" cy="0"/>
+        </a:xfrm>
+      </p:grpSpPr>
+      <p:sp>
+        <p:nvSpPr>
+          <p:cNvPr id="2" name="Slide Image Placeholder 1"/>
+          <p:cNvSpPr>
+            <a:spLocks noGrp="1" noRot="1" noChangeAspect="1"/>
+          </p:cNvSpPr>
+          <p:nvPr>
+            <p:ph type="sldImg"/>
+          </p:nvPr>
+        </p:nvSpPr>
+        <p:spPr/>
+      </p:sp>
+      <p:sp>
+        <p:nvSpPr>
+          <p:cNvPr id="3" name="Notes Placeholder 2"/>
+          <p:cNvSpPr>
+            <a:spLocks noGrp="1"/>
+          </p:cNvSpPr>
+          <p:nvPr>
+            <p:ph type="body" idx="1"/>
+          </p:nvPr>
+        </p:nvSpPr>
+        <p:spPr/>
+        <p:txBody>
+          <a:bodyPr/>
+          <a:lstStyle/>
+          <a:p>
+            <a:r>
+              <a:rPr lang="en-US" dirty="0"/>
+              <a:t>Pattern:</a:t>
+            </a:r>
+          </a:p>
+          <a:p>
+            <a:r>
+              <a:rPr lang="en-US" dirty="0"/>
+              <a:t>1) Here is the concept</a:t>
+            </a:r>
+          </a:p>
+          <a:p>
+            <a:r>
+              <a:rPr lang="en-US" dirty="0"/>
+              <a:t>2) Here is the code</a:t>
+            </a:r>
+          </a:p>
+          <a:p>
+            <a:r>
+              <a:rPr lang="en-US" dirty="0"/>
+              <a:t>3) What do you think it will do?</a:t>
+            </a:r>
+          </a:p>
+          <a:p>
+            <a:r>
+              <a:rPr lang="en-US" dirty="0"/>
+              <a:t>4) Run it to see what it does</a:t>
+            </a:r>
+          </a:p>
+          <a:p>
+            <a:r>
+              <a:rPr lang="en-US" dirty="0"/>
+              <a:t>5) How did it do that?</a:t>
+            </a:r>
+          </a:p>
+          <a:p>
+            <a:endParaRPr lang="en-US" dirty="0"/>
+          </a:p>
+        </p:txBody>
+      </p:sp>
+      <p:sp>
+        <p:nvSpPr>
+          <p:cNvPr id="4" name="Slide Number Placeholder 3"/>
+          <p:cNvSpPr>
+            <a:spLocks noGrp="1"/>
+          </p:cNvSpPr>
+          <p:nvPr>
+            <p:ph type="sldNum" sz="quarter" idx="5"/>
+          </p:nvPr>
+        </p:nvSpPr>
+        <p:spPr/>
+        <p:txBody>
+          <a:bodyPr/>
+          <a:lstStyle/>
+          <a:p>
+            <a:fld id="{8B9E4114-3C63-7747-8961-9652315A5F8D}" type="slidenum">
+              <a:rPr lang="en-US" smtClean="0"/>
+              <a:t>24</a:t>
+            </a:fld>
+            <a:endParaRPr lang="en-US"/>
+          </a:p>
+        </p:txBody>
+      </p:sp>
+    </p:spTree>
+    <p:extLst>
+      <p:ext uri="{BB962C8B-B14F-4D97-AF65-F5344CB8AC3E}">
+        <p14:creationId xmlns:p14="http://schemas.microsoft.com/office/powerpoint/2010/main" val="2566076202"/>
+      </p:ext>
+    </p:extLst>
+  </p:cSld>
+  <p:clrMapOvr>
+    <a:masterClrMapping/>
+  </p:clrMapOvr>
+</p:notes>
+</file>
+
+<file path=ppt/notesSlides/notesSlide19.xml><?xml version="1.0" encoding="utf-8"?>
+<p:notes xmlns:a="http://schemas.openxmlformats.org/drawingml/2006/main" xmlns:r="http://schemas.openxmlformats.org/officeDocument/2006/relationships" xmlns:p="http://schemas.openxmlformats.org/presentationml/2006/main">
+  <p:cSld>
+    <p:spTree>
+      <p:nvGrpSpPr>
+        <p:cNvPr id="1" name=""/>
+        <p:cNvGrpSpPr/>
+        <p:nvPr/>
+      </p:nvGrpSpPr>
+      <p:grpSpPr>
+        <a:xfrm>
+          <a:off x="0" y="0"/>
+          <a:ext cx="0" cy="0"/>
+          <a:chOff x="0" y="0"/>
+          <a:chExt cx="0" cy="0"/>
+        </a:xfrm>
+      </p:grpSpPr>
+      <p:sp>
+        <p:nvSpPr>
+          <p:cNvPr id="2" name="Slide Image Placeholder 1"/>
+          <p:cNvSpPr>
+            <a:spLocks noGrp="1" noRot="1" noChangeAspect="1"/>
+          </p:cNvSpPr>
+          <p:nvPr>
+            <p:ph type="sldImg"/>
+          </p:nvPr>
+        </p:nvSpPr>
+        <p:spPr/>
+      </p:sp>
+      <p:sp>
+        <p:nvSpPr>
+          <p:cNvPr id="3" name="Notes Placeholder 2"/>
+          <p:cNvSpPr>
+            <a:spLocks noGrp="1"/>
+          </p:cNvSpPr>
+          <p:nvPr>
+            <p:ph type="body" idx="1"/>
+          </p:nvPr>
+        </p:nvSpPr>
+        <p:spPr/>
+        <p:txBody>
+          <a:bodyPr/>
+          <a:lstStyle/>
+          <a:p>
+            <a:r>
+              <a:rPr lang="en-US" dirty="0"/>
+              <a:t>Pattern:</a:t>
+            </a:r>
+          </a:p>
+          <a:p>
+            <a:r>
+              <a:rPr lang="en-US" dirty="0"/>
+              <a:t>1) Here is the concept</a:t>
+            </a:r>
+          </a:p>
+          <a:p>
+            <a:r>
+              <a:rPr lang="en-US" dirty="0"/>
+              <a:t>2) Here is the code</a:t>
+            </a:r>
+          </a:p>
+          <a:p>
+            <a:r>
+              <a:rPr lang="en-US" dirty="0"/>
+              <a:t>3) What do you think it will do?</a:t>
+            </a:r>
+          </a:p>
+          <a:p>
+            <a:r>
+              <a:rPr lang="en-US" dirty="0"/>
+              <a:t>4) Run it to see what it does</a:t>
+            </a:r>
+          </a:p>
+          <a:p>
+            <a:r>
+              <a:rPr lang="en-US" dirty="0"/>
+              <a:t>5) How did it do that?</a:t>
+            </a:r>
+          </a:p>
+          <a:p>
+            <a:endParaRPr lang="en-US" dirty="0"/>
+          </a:p>
+        </p:txBody>
+      </p:sp>
+      <p:sp>
+        <p:nvSpPr>
+          <p:cNvPr id="4" name="Slide Number Placeholder 3"/>
+          <p:cNvSpPr>
+            <a:spLocks noGrp="1"/>
+          </p:cNvSpPr>
+          <p:nvPr>
+            <p:ph type="sldNum" sz="quarter" idx="5"/>
+          </p:nvPr>
+        </p:nvSpPr>
+        <p:spPr/>
+        <p:txBody>
+          <a:bodyPr/>
+          <a:lstStyle/>
+          <a:p>
+            <a:fld id="{8B9E4114-3C63-7747-8961-9652315A5F8D}" type="slidenum">
+              <a:rPr lang="en-US" smtClean="0"/>
+              <a:t>25</a:t>
+            </a:fld>
+            <a:endParaRPr lang="en-US"/>
+          </a:p>
+        </p:txBody>
+      </p:sp>
+    </p:spTree>
+    <p:extLst>
+      <p:ext uri="{BB962C8B-B14F-4D97-AF65-F5344CB8AC3E}">
+        <p14:creationId xmlns:p14="http://schemas.microsoft.com/office/powerpoint/2010/main" val="853544838"/>
       </p:ext>
     </p:extLst>
   </p:cSld>
@@ -1660,6 +2134,672 @@
     <p:extLst>
       <p:ext uri="{BB962C8B-B14F-4D97-AF65-F5344CB8AC3E}">
         <p14:creationId xmlns:p14="http://schemas.microsoft.com/office/powerpoint/2010/main" val="1376922145"/>
+      </p:ext>
+    </p:extLst>
+  </p:cSld>
+  <p:clrMapOvr>
+    <a:masterClrMapping/>
+  </p:clrMapOvr>
+</p:notes>
+</file>
+
+<file path=ppt/notesSlides/notesSlide20.xml><?xml version="1.0" encoding="utf-8"?>
+<p:notes xmlns:a="http://schemas.openxmlformats.org/drawingml/2006/main" xmlns:r="http://schemas.openxmlformats.org/officeDocument/2006/relationships" xmlns:p="http://schemas.openxmlformats.org/presentationml/2006/main">
+  <p:cSld>
+    <p:spTree>
+      <p:nvGrpSpPr>
+        <p:cNvPr id="1" name=""/>
+        <p:cNvGrpSpPr/>
+        <p:nvPr/>
+      </p:nvGrpSpPr>
+      <p:grpSpPr>
+        <a:xfrm>
+          <a:off x="0" y="0"/>
+          <a:ext cx="0" cy="0"/>
+          <a:chOff x="0" y="0"/>
+          <a:chExt cx="0" cy="0"/>
+        </a:xfrm>
+      </p:grpSpPr>
+      <p:sp>
+        <p:nvSpPr>
+          <p:cNvPr id="2" name="Slide Image Placeholder 1"/>
+          <p:cNvSpPr>
+            <a:spLocks noGrp="1" noRot="1" noChangeAspect="1"/>
+          </p:cNvSpPr>
+          <p:nvPr>
+            <p:ph type="sldImg"/>
+          </p:nvPr>
+        </p:nvSpPr>
+        <p:spPr/>
+      </p:sp>
+      <p:sp>
+        <p:nvSpPr>
+          <p:cNvPr id="3" name="Notes Placeholder 2"/>
+          <p:cNvSpPr>
+            <a:spLocks noGrp="1"/>
+          </p:cNvSpPr>
+          <p:nvPr>
+            <p:ph type="body" idx="1"/>
+          </p:nvPr>
+        </p:nvSpPr>
+        <p:spPr/>
+        <p:txBody>
+          <a:bodyPr/>
+          <a:lstStyle/>
+          <a:p>
+            <a:r>
+              <a:rPr lang="en-US" dirty="0"/>
+              <a:t>Pattern:</a:t>
+            </a:r>
+          </a:p>
+          <a:p>
+            <a:r>
+              <a:rPr lang="en-US" dirty="0"/>
+              <a:t>1) Here is the concept</a:t>
+            </a:r>
+          </a:p>
+          <a:p>
+            <a:r>
+              <a:rPr lang="en-US" dirty="0"/>
+              <a:t>2) Here is the code</a:t>
+            </a:r>
+          </a:p>
+          <a:p>
+            <a:r>
+              <a:rPr lang="en-US" dirty="0"/>
+              <a:t>3) What do you think it will do?</a:t>
+            </a:r>
+          </a:p>
+          <a:p>
+            <a:r>
+              <a:rPr lang="en-US" dirty="0"/>
+              <a:t>4) Run it to see what it does</a:t>
+            </a:r>
+          </a:p>
+          <a:p>
+            <a:r>
+              <a:rPr lang="en-US" dirty="0"/>
+              <a:t>5) How did it do that?</a:t>
+            </a:r>
+          </a:p>
+          <a:p>
+            <a:endParaRPr lang="en-US" dirty="0"/>
+          </a:p>
+          <a:p>
+            <a:endParaRPr lang="en-US" dirty="0"/>
+          </a:p>
+          <a:p>
+            <a:r>
+              <a:rPr lang="en-US" dirty="0"/>
+              <a:t># </a:t>
+            </a:r>
+            <a:r>
+              <a:rPr lang="en-US" dirty="0" err="1"/>
+              <a:t>app.callback</a:t>
+            </a:r>
+            <a:r>
+              <a:rPr lang="en-US" dirty="0"/>
+              <a:t> is a decorator which means that it takes a function</a:t>
+            </a:r>
+          </a:p>
+          <a:p>
+            <a:r>
+              <a:rPr lang="en-US" dirty="0"/>
+              <a:t># as its argument.</a:t>
+            </a:r>
+          </a:p>
+          <a:p>
+            <a:endParaRPr lang="en-US" dirty="0"/>
+          </a:p>
+          <a:p>
+            <a:r>
+              <a:rPr lang="en-US" dirty="0"/>
+              <a:t># highlight is a function "generator": it's a function that returns function</a:t>
+            </a:r>
+          </a:p>
+        </p:txBody>
+      </p:sp>
+      <p:sp>
+        <p:nvSpPr>
+          <p:cNvPr id="4" name="Slide Number Placeholder 3"/>
+          <p:cNvSpPr>
+            <a:spLocks noGrp="1"/>
+          </p:cNvSpPr>
+          <p:nvPr>
+            <p:ph type="sldNum" sz="quarter" idx="5"/>
+          </p:nvPr>
+        </p:nvSpPr>
+        <p:spPr/>
+        <p:txBody>
+          <a:bodyPr/>
+          <a:lstStyle/>
+          <a:p>
+            <a:fld id="{8B9E4114-3C63-7747-8961-9652315A5F8D}" type="slidenum">
+              <a:rPr lang="en-US" smtClean="0"/>
+              <a:t>26</a:t>
+            </a:fld>
+            <a:endParaRPr lang="en-US"/>
+          </a:p>
+        </p:txBody>
+      </p:sp>
+    </p:spTree>
+    <p:extLst>
+      <p:ext uri="{BB962C8B-B14F-4D97-AF65-F5344CB8AC3E}">
+        <p14:creationId xmlns:p14="http://schemas.microsoft.com/office/powerpoint/2010/main" val="3907372116"/>
+      </p:ext>
+    </p:extLst>
+  </p:cSld>
+  <p:clrMapOvr>
+    <a:masterClrMapping/>
+  </p:clrMapOvr>
+</p:notes>
+</file>
+
+<file path=ppt/notesSlides/notesSlide21.xml><?xml version="1.0" encoding="utf-8"?>
+<p:notes xmlns:a="http://schemas.openxmlformats.org/drawingml/2006/main" xmlns:r="http://schemas.openxmlformats.org/officeDocument/2006/relationships" xmlns:p="http://schemas.openxmlformats.org/presentationml/2006/main">
+  <p:cSld>
+    <p:spTree>
+      <p:nvGrpSpPr>
+        <p:cNvPr id="1" name=""/>
+        <p:cNvGrpSpPr/>
+        <p:nvPr/>
+      </p:nvGrpSpPr>
+      <p:grpSpPr>
+        <a:xfrm>
+          <a:off x="0" y="0"/>
+          <a:ext cx="0" cy="0"/>
+          <a:chOff x="0" y="0"/>
+          <a:chExt cx="0" cy="0"/>
+        </a:xfrm>
+      </p:grpSpPr>
+      <p:sp>
+        <p:nvSpPr>
+          <p:cNvPr id="2" name="Slide Image Placeholder 1"/>
+          <p:cNvSpPr>
+            <a:spLocks noGrp="1" noRot="1" noChangeAspect="1"/>
+          </p:cNvSpPr>
+          <p:nvPr>
+            <p:ph type="sldImg"/>
+          </p:nvPr>
+        </p:nvSpPr>
+        <p:spPr/>
+      </p:sp>
+      <p:sp>
+        <p:nvSpPr>
+          <p:cNvPr id="3" name="Notes Placeholder 2"/>
+          <p:cNvSpPr>
+            <a:spLocks noGrp="1"/>
+          </p:cNvSpPr>
+          <p:nvPr>
+            <p:ph type="body" idx="1"/>
+          </p:nvPr>
+        </p:nvSpPr>
+        <p:spPr/>
+        <p:txBody>
+          <a:bodyPr/>
+          <a:lstStyle/>
+          <a:p>
+            <a:r>
+              <a:rPr lang="en-US" dirty="0"/>
+              <a:t>Pattern:</a:t>
+            </a:r>
+          </a:p>
+          <a:p>
+            <a:r>
+              <a:rPr lang="en-US" dirty="0"/>
+              <a:t>1) Here is the concept</a:t>
+            </a:r>
+          </a:p>
+          <a:p>
+            <a:r>
+              <a:rPr lang="en-US" dirty="0"/>
+              <a:t>2) Here is the code</a:t>
+            </a:r>
+          </a:p>
+          <a:p>
+            <a:r>
+              <a:rPr lang="en-US" dirty="0"/>
+              <a:t>3) What do you think it will do?</a:t>
+            </a:r>
+          </a:p>
+          <a:p>
+            <a:r>
+              <a:rPr lang="en-US" dirty="0"/>
+              <a:t>4) Run it to see what it does</a:t>
+            </a:r>
+          </a:p>
+          <a:p>
+            <a:r>
+              <a:rPr lang="en-US" dirty="0"/>
+              <a:t>5) How did it do that?</a:t>
+            </a:r>
+          </a:p>
+          <a:p>
+            <a:endParaRPr lang="en-US" dirty="0"/>
+          </a:p>
+        </p:txBody>
+      </p:sp>
+      <p:sp>
+        <p:nvSpPr>
+          <p:cNvPr id="4" name="Slide Number Placeholder 3"/>
+          <p:cNvSpPr>
+            <a:spLocks noGrp="1"/>
+          </p:cNvSpPr>
+          <p:nvPr>
+            <p:ph type="sldNum" sz="quarter" idx="5"/>
+          </p:nvPr>
+        </p:nvSpPr>
+        <p:spPr/>
+        <p:txBody>
+          <a:bodyPr/>
+          <a:lstStyle/>
+          <a:p>
+            <a:fld id="{8B9E4114-3C63-7747-8961-9652315A5F8D}" type="slidenum">
+              <a:rPr lang="en-US" smtClean="0"/>
+              <a:t>27</a:t>
+            </a:fld>
+            <a:endParaRPr lang="en-US"/>
+          </a:p>
+        </p:txBody>
+      </p:sp>
+    </p:spTree>
+    <p:extLst>
+      <p:ext uri="{BB962C8B-B14F-4D97-AF65-F5344CB8AC3E}">
+        <p14:creationId xmlns:p14="http://schemas.microsoft.com/office/powerpoint/2010/main" val="18317367"/>
+      </p:ext>
+    </p:extLst>
+  </p:cSld>
+  <p:clrMapOvr>
+    <a:masterClrMapping/>
+  </p:clrMapOvr>
+</p:notes>
+</file>
+
+<file path=ppt/notesSlides/notesSlide22.xml><?xml version="1.0" encoding="utf-8"?>
+<p:notes xmlns:a="http://schemas.openxmlformats.org/drawingml/2006/main" xmlns:r="http://schemas.openxmlformats.org/officeDocument/2006/relationships" xmlns:p="http://schemas.openxmlformats.org/presentationml/2006/main">
+  <p:cSld>
+    <p:spTree>
+      <p:nvGrpSpPr>
+        <p:cNvPr id="1" name=""/>
+        <p:cNvGrpSpPr/>
+        <p:nvPr/>
+      </p:nvGrpSpPr>
+      <p:grpSpPr>
+        <a:xfrm>
+          <a:off x="0" y="0"/>
+          <a:ext cx="0" cy="0"/>
+          <a:chOff x="0" y="0"/>
+          <a:chExt cx="0" cy="0"/>
+        </a:xfrm>
+      </p:grpSpPr>
+      <p:sp>
+        <p:nvSpPr>
+          <p:cNvPr id="2" name="Slide Image Placeholder 1"/>
+          <p:cNvSpPr>
+            <a:spLocks noGrp="1" noRot="1" noChangeAspect="1"/>
+          </p:cNvSpPr>
+          <p:nvPr>
+            <p:ph type="sldImg"/>
+          </p:nvPr>
+        </p:nvSpPr>
+        <p:spPr/>
+      </p:sp>
+      <p:sp>
+        <p:nvSpPr>
+          <p:cNvPr id="3" name="Notes Placeholder 2"/>
+          <p:cNvSpPr>
+            <a:spLocks noGrp="1"/>
+          </p:cNvSpPr>
+          <p:nvPr>
+            <p:ph type="body" idx="1"/>
+          </p:nvPr>
+        </p:nvSpPr>
+        <p:spPr/>
+        <p:txBody>
+          <a:bodyPr/>
+          <a:lstStyle/>
+          <a:p>
+            <a:r>
+              <a:rPr lang="en-US" dirty="0"/>
+              <a:t>Pattern:</a:t>
+            </a:r>
+          </a:p>
+          <a:p>
+            <a:r>
+              <a:rPr lang="en-US" dirty="0"/>
+              <a:t>1) Here is the concept</a:t>
+            </a:r>
+          </a:p>
+          <a:p>
+            <a:r>
+              <a:rPr lang="en-US" dirty="0"/>
+              <a:t>2) Here is the code</a:t>
+            </a:r>
+          </a:p>
+          <a:p>
+            <a:r>
+              <a:rPr lang="en-US" dirty="0"/>
+              <a:t>3) What do you think it will do?</a:t>
+            </a:r>
+          </a:p>
+          <a:p>
+            <a:r>
+              <a:rPr lang="en-US" dirty="0"/>
+              <a:t>4) Run it to see what it does</a:t>
+            </a:r>
+          </a:p>
+          <a:p>
+            <a:r>
+              <a:rPr lang="en-US" dirty="0"/>
+              <a:t>5) How did it do that?</a:t>
+            </a:r>
+          </a:p>
+          <a:p>
+            <a:endParaRPr lang="en-US" dirty="0"/>
+          </a:p>
+          <a:p>
+            <a:r>
+              <a:rPr lang="en-US" dirty="0"/>
+              <a:t>Show what the result should look like</a:t>
+            </a:r>
+          </a:p>
+        </p:txBody>
+      </p:sp>
+      <p:sp>
+        <p:nvSpPr>
+          <p:cNvPr id="4" name="Slide Number Placeholder 3"/>
+          <p:cNvSpPr>
+            <a:spLocks noGrp="1"/>
+          </p:cNvSpPr>
+          <p:nvPr>
+            <p:ph type="sldNum" sz="quarter" idx="5"/>
+          </p:nvPr>
+        </p:nvSpPr>
+        <p:spPr/>
+        <p:txBody>
+          <a:bodyPr/>
+          <a:lstStyle/>
+          <a:p>
+            <a:fld id="{8B9E4114-3C63-7747-8961-9652315A5F8D}" type="slidenum">
+              <a:rPr lang="en-US" smtClean="0"/>
+              <a:t>28</a:t>
+            </a:fld>
+            <a:endParaRPr lang="en-US"/>
+          </a:p>
+        </p:txBody>
+      </p:sp>
+    </p:spTree>
+    <p:extLst>
+      <p:ext uri="{BB962C8B-B14F-4D97-AF65-F5344CB8AC3E}">
+        <p14:creationId xmlns:p14="http://schemas.microsoft.com/office/powerpoint/2010/main" val="2699500035"/>
+      </p:ext>
+    </p:extLst>
+  </p:cSld>
+  <p:clrMapOvr>
+    <a:masterClrMapping/>
+  </p:clrMapOvr>
+</p:notes>
+</file>
+
+<file path=ppt/notesSlides/notesSlide23.xml><?xml version="1.0" encoding="utf-8"?>
+<p:notes xmlns:a="http://schemas.openxmlformats.org/drawingml/2006/main" xmlns:r="http://schemas.openxmlformats.org/officeDocument/2006/relationships" xmlns:p="http://schemas.openxmlformats.org/presentationml/2006/main">
+  <p:cSld>
+    <p:spTree>
+      <p:nvGrpSpPr>
+        <p:cNvPr id="1" name=""/>
+        <p:cNvGrpSpPr/>
+        <p:nvPr/>
+      </p:nvGrpSpPr>
+      <p:grpSpPr>
+        <a:xfrm>
+          <a:off x="0" y="0"/>
+          <a:ext cx="0" cy="0"/>
+          <a:chOff x="0" y="0"/>
+          <a:chExt cx="0" cy="0"/>
+        </a:xfrm>
+      </p:grpSpPr>
+      <p:sp>
+        <p:nvSpPr>
+          <p:cNvPr id="2" name="Slide Image Placeholder 1"/>
+          <p:cNvSpPr>
+            <a:spLocks noGrp="1" noRot="1" noChangeAspect="1"/>
+          </p:cNvSpPr>
+          <p:nvPr>
+            <p:ph type="sldImg"/>
+          </p:nvPr>
+        </p:nvSpPr>
+        <p:spPr/>
+      </p:sp>
+      <p:sp>
+        <p:nvSpPr>
+          <p:cNvPr id="3" name="Notes Placeholder 2"/>
+          <p:cNvSpPr>
+            <a:spLocks noGrp="1"/>
+          </p:cNvSpPr>
+          <p:nvPr>
+            <p:ph type="body" idx="1"/>
+          </p:nvPr>
+        </p:nvSpPr>
+        <p:spPr/>
+        <p:txBody>
+          <a:bodyPr/>
+          <a:lstStyle/>
+          <a:p>
+            <a:r>
+              <a:rPr lang="en-US" dirty="0"/>
+              <a:t>I was determined to run my app on a Source Notebook, despite the fact that Dash is not supported on </a:t>
+            </a:r>
+            <a:r>
+              <a:rPr lang="en-US" dirty="0" err="1"/>
+              <a:t>Jupyter</a:t>
+            </a:r>
+            <a:r>
+              <a:rPr lang="en-US" dirty="0"/>
+              <a:t> Notebooks </a:t>
+            </a:r>
+          </a:p>
+          <a:p>
+            <a:r>
+              <a:rPr lang="en-US" dirty="0"/>
+              <a:t>I succeeded and got some screenshots but since then it seems an update has broken it</a:t>
+            </a:r>
+          </a:p>
+          <a:p>
+            <a:r>
+              <a:rPr lang="en-US" dirty="0"/>
+              <a:t>So we’ll have to settle for the screenshots </a:t>
+            </a:r>
+          </a:p>
+          <a:p>
+            <a:endParaRPr lang="en-US" dirty="0"/>
+          </a:p>
+          <a:p>
+            <a:r>
+              <a:rPr lang="en-US" dirty="0"/>
+              <a:t>Open Source</a:t>
+            </a:r>
+          </a:p>
+          <a:p>
+            <a:r>
+              <a:rPr lang="en-US" dirty="0" err="1"/>
+              <a:t>Naviagate</a:t>
+            </a:r>
+            <a:r>
+              <a:rPr lang="en-US" dirty="0"/>
+              <a:t> to </a:t>
+            </a:r>
+            <a:r>
+              <a:rPr lang="en-US" dirty="0" err="1"/>
+              <a:t>Github</a:t>
+            </a:r>
+            <a:r>
+              <a:rPr lang="en-US" dirty="0"/>
+              <a:t> </a:t>
+            </a:r>
+          </a:p>
+          <a:p>
+            <a:r>
+              <a:rPr lang="en-US" dirty="0"/>
+              <a:t>Open </a:t>
+            </a:r>
+            <a:r>
+              <a:rPr lang="en-US" dirty="0" err="1"/>
+              <a:t>model.py</a:t>
+            </a:r>
+            <a:r>
+              <a:rPr lang="en-US" dirty="0"/>
+              <a:t> and </a:t>
+            </a:r>
+            <a:r>
+              <a:rPr lang="en-US" dirty="0" err="1"/>
+              <a:t>hightlight</a:t>
+            </a:r>
+            <a:r>
+              <a:rPr lang="en-US" dirty="0"/>
+              <a:t> model</a:t>
+            </a:r>
+          </a:p>
+          <a:p>
+            <a:r>
+              <a:rPr lang="en-US" dirty="0"/>
+              <a:t>Open visualizations and show NN architecture</a:t>
+            </a:r>
+          </a:p>
+          <a:p>
+            <a:r>
+              <a:rPr lang="en-US" dirty="0" err="1"/>
+              <a:t>README.md</a:t>
+            </a:r>
+            <a:endParaRPr lang="en-US" dirty="0"/>
+          </a:p>
+          <a:p>
+            <a:r>
+              <a:rPr lang="en-US" dirty="0"/>
+              <a:t>Open both images in separate tabs</a:t>
+            </a:r>
+          </a:p>
+          <a:p>
+            <a:r>
+              <a:rPr lang="en-US" dirty="0"/>
+              <a:t>Alternate back and forth between them</a:t>
+            </a:r>
+          </a:p>
+        </p:txBody>
+      </p:sp>
+      <p:sp>
+        <p:nvSpPr>
+          <p:cNvPr id="4" name="Slide Number Placeholder 3"/>
+          <p:cNvSpPr>
+            <a:spLocks noGrp="1"/>
+          </p:cNvSpPr>
+          <p:nvPr>
+            <p:ph type="sldNum" sz="quarter" idx="5"/>
+          </p:nvPr>
+        </p:nvSpPr>
+        <p:spPr/>
+        <p:txBody>
+          <a:bodyPr/>
+          <a:lstStyle/>
+          <a:p>
+            <a:fld id="{8B9E4114-3C63-7747-8961-9652315A5F8D}" type="slidenum">
+              <a:rPr lang="en-US" smtClean="0"/>
+              <a:t>29</a:t>
+            </a:fld>
+            <a:endParaRPr lang="en-US"/>
+          </a:p>
+        </p:txBody>
+      </p:sp>
+    </p:spTree>
+    <p:extLst>
+      <p:ext uri="{BB962C8B-B14F-4D97-AF65-F5344CB8AC3E}">
+        <p14:creationId xmlns:p14="http://schemas.microsoft.com/office/powerpoint/2010/main" val="3582251134"/>
+      </p:ext>
+    </p:extLst>
+  </p:cSld>
+  <p:clrMapOvr>
+    <a:masterClrMapping/>
+  </p:clrMapOvr>
+</p:notes>
+</file>
+
+<file path=ppt/notesSlides/notesSlide24.xml><?xml version="1.0" encoding="utf-8"?>
+<p:notes xmlns:a="http://schemas.openxmlformats.org/drawingml/2006/main" xmlns:r="http://schemas.openxmlformats.org/officeDocument/2006/relationships" xmlns:p="http://schemas.openxmlformats.org/presentationml/2006/main">
+  <p:cSld>
+    <p:spTree>
+      <p:nvGrpSpPr>
+        <p:cNvPr id="1" name=""/>
+        <p:cNvGrpSpPr/>
+        <p:nvPr/>
+      </p:nvGrpSpPr>
+      <p:grpSpPr>
+        <a:xfrm>
+          <a:off x="0" y="0"/>
+          <a:ext cx="0" cy="0"/>
+          <a:chOff x="0" y="0"/>
+          <a:chExt cx="0" cy="0"/>
+        </a:xfrm>
+      </p:grpSpPr>
+      <p:sp>
+        <p:nvSpPr>
+          <p:cNvPr id="2" name="Slide Image Placeholder 1"/>
+          <p:cNvSpPr>
+            <a:spLocks noGrp="1" noRot="1" noChangeAspect="1"/>
+          </p:cNvSpPr>
+          <p:nvPr>
+            <p:ph type="sldImg"/>
+          </p:nvPr>
+        </p:nvSpPr>
+        <p:spPr/>
+      </p:sp>
+      <p:sp>
+        <p:nvSpPr>
+          <p:cNvPr id="3" name="Notes Placeholder 2"/>
+          <p:cNvSpPr>
+            <a:spLocks noGrp="1"/>
+          </p:cNvSpPr>
+          <p:nvPr>
+            <p:ph type="body" idx="1"/>
+          </p:nvPr>
+        </p:nvSpPr>
+        <p:spPr/>
+        <p:txBody>
+          <a:bodyPr/>
+          <a:lstStyle/>
+          <a:p>
+            <a:r>
+              <a:rPr lang="en-US" dirty="0"/>
+              <a:t>Only if time allows</a:t>
+            </a:r>
+          </a:p>
+        </p:txBody>
+      </p:sp>
+      <p:sp>
+        <p:nvSpPr>
+          <p:cNvPr id="4" name="Slide Number Placeholder 3"/>
+          <p:cNvSpPr>
+            <a:spLocks noGrp="1"/>
+          </p:cNvSpPr>
+          <p:nvPr>
+            <p:ph type="sldNum" sz="quarter" idx="5"/>
+          </p:nvPr>
+        </p:nvSpPr>
+        <p:spPr/>
+        <p:txBody>
+          <a:bodyPr/>
+          <a:lstStyle/>
+          <a:p>
+            <a:fld id="{8B9E4114-3C63-7747-8961-9652315A5F8D}" type="slidenum">
+              <a:rPr lang="en-US" smtClean="0"/>
+              <a:t>34</a:t>
+            </a:fld>
+            <a:endParaRPr lang="en-US"/>
+          </a:p>
+        </p:txBody>
+      </p:sp>
+    </p:spTree>
+    <p:extLst>
+      <p:ext uri="{BB962C8B-B14F-4D97-AF65-F5344CB8AC3E}">
+        <p14:creationId xmlns:p14="http://schemas.microsoft.com/office/powerpoint/2010/main" val="2266842545"/>
       </p:ext>
     </p:extLst>
   </p:cSld>
@@ -3346,297 +4486,6 @@
           <a:p>
             <a:endParaRPr lang="en-US" dirty="0"/>
           </a:p>
-          <a:p>
-            <a:r>
-              <a:rPr lang="en-US" sz="1200" b="0" i="0" kern="1200" dirty="0">
-                <a:solidFill>
-                  <a:schemeClr val="tx1"/>
-                </a:solidFill>
-                <a:effectLst/>
-                <a:latin typeface="+mn-lt"/>
-                <a:ea typeface="+mn-ea"/>
-                <a:cs typeface="+mn-cs"/>
-              </a:rPr>
-              <a:t>1) The layout is composed of a tree of "components" like </a:t>
-            </a:r>
-            <a:r>
-              <a:rPr lang="en-US" sz="1200" b="0" i="0" kern="1200" dirty="0" err="1">
-                <a:solidFill>
-                  <a:schemeClr val="tx1"/>
-                </a:solidFill>
-                <a:effectLst/>
-                <a:latin typeface="+mn-lt"/>
-                <a:ea typeface="+mn-ea"/>
-                <a:cs typeface="+mn-cs"/>
-              </a:rPr>
-              <a:t>html.Div</a:t>
-            </a:r>
-            <a:r>
-              <a:rPr lang="en-US" sz="1200" b="0" i="0" kern="1200" dirty="0">
-                <a:solidFill>
-                  <a:schemeClr val="tx1"/>
-                </a:solidFill>
-                <a:effectLst/>
-                <a:latin typeface="+mn-lt"/>
-                <a:ea typeface="+mn-ea"/>
-                <a:cs typeface="+mn-cs"/>
-              </a:rPr>
-              <a:t> and </a:t>
-            </a:r>
-            <a:r>
-              <a:rPr lang="en-US" sz="1200" b="0" i="0" kern="1200" dirty="0" err="1">
-                <a:solidFill>
-                  <a:schemeClr val="tx1"/>
-                </a:solidFill>
-                <a:effectLst/>
-                <a:latin typeface="+mn-lt"/>
-                <a:ea typeface="+mn-ea"/>
-                <a:cs typeface="+mn-cs"/>
-              </a:rPr>
-              <a:t>dcc.Graph</a:t>
-            </a:r>
-            <a:r>
-              <a:rPr lang="en-US" sz="1200" b="0" i="0" kern="1200" dirty="0">
-                <a:solidFill>
-                  <a:schemeClr val="tx1"/>
-                </a:solidFill>
-                <a:effectLst/>
-                <a:latin typeface="+mn-lt"/>
-                <a:ea typeface="+mn-ea"/>
-                <a:cs typeface="+mn-cs"/>
-              </a:rPr>
-              <a:t>.</a:t>
-            </a:r>
-          </a:p>
-          <a:p>
-            <a:r>
-              <a:rPr lang="en-US" sz="1200" b="0" i="0" kern="1200" dirty="0">
-                <a:solidFill>
-                  <a:schemeClr val="tx1"/>
-                </a:solidFill>
-                <a:effectLst/>
-                <a:latin typeface="+mn-lt"/>
-                <a:ea typeface="+mn-ea"/>
-                <a:cs typeface="+mn-cs"/>
-              </a:rPr>
-              <a:t>2) The </a:t>
-            </a:r>
-            <a:r>
-              <a:rPr lang="en-US" sz="1200" b="0" i="0" kern="1200" dirty="0" err="1">
-                <a:solidFill>
-                  <a:schemeClr val="tx1"/>
-                </a:solidFill>
-                <a:effectLst/>
-                <a:latin typeface="+mn-lt"/>
-                <a:ea typeface="+mn-ea"/>
-                <a:cs typeface="+mn-cs"/>
-              </a:rPr>
-              <a:t>dash_html_components</a:t>
-            </a:r>
-            <a:r>
-              <a:rPr lang="en-US" sz="1200" b="0" i="0" kern="1200" dirty="0">
-                <a:solidFill>
-                  <a:schemeClr val="tx1"/>
-                </a:solidFill>
-                <a:effectLst/>
-                <a:latin typeface="+mn-lt"/>
-                <a:ea typeface="+mn-ea"/>
-                <a:cs typeface="+mn-cs"/>
-              </a:rPr>
-              <a:t> library has a component for every HTML tag. The html.H1(children='Hello Dash') component generates a &lt;h1&gt;Hello Dash&lt;/h1&gt; HTML element in your application.</a:t>
-            </a:r>
-          </a:p>
-          <a:p>
-            <a:r>
-              <a:rPr lang="en-US" sz="1200" b="0" i="0" kern="1200" dirty="0">
-                <a:solidFill>
-                  <a:schemeClr val="tx1"/>
-                </a:solidFill>
-                <a:effectLst/>
-                <a:latin typeface="+mn-lt"/>
-                <a:ea typeface="+mn-ea"/>
-                <a:cs typeface="+mn-cs"/>
-              </a:rPr>
-              <a:t>3) Not all components are pure HTML. The </a:t>
-            </a:r>
-            <a:r>
-              <a:rPr lang="en-US" sz="1200" b="0" i="0" kern="1200" dirty="0" err="1">
-                <a:solidFill>
-                  <a:schemeClr val="tx1"/>
-                </a:solidFill>
-                <a:effectLst/>
-                <a:latin typeface="+mn-lt"/>
-                <a:ea typeface="+mn-ea"/>
-                <a:cs typeface="+mn-cs"/>
-              </a:rPr>
-              <a:t>dash_core_components</a:t>
-            </a:r>
-            <a:r>
-              <a:rPr lang="en-US" sz="1200" b="0" i="0" kern="1200" dirty="0">
-                <a:solidFill>
-                  <a:schemeClr val="tx1"/>
-                </a:solidFill>
-                <a:effectLst/>
-                <a:latin typeface="+mn-lt"/>
-                <a:ea typeface="+mn-ea"/>
-                <a:cs typeface="+mn-cs"/>
-              </a:rPr>
-              <a:t> describe higher-level components that are interactive and are generated with JavaScript, HTML, and CSS through the </a:t>
-            </a:r>
-            <a:r>
-              <a:rPr lang="en-US" sz="1200" b="0" i="0" kern="1200" dirty="0" err="1">
-                <a:solidFill>
-                  <a:schemeClr val="tx1"/>
-                </a:solidFill>
-                <a:effectLst/>
-                <a:latin typeface="+mn-lt"/>
-                <a:ea typeface="+mn-ea"/>
-                <a:cs typeface="+mn-cs"/>
-              </a:rPr>
-              <a:t>React.js</a:t>
-            </a:r>
-            <a:r>
-              <a:rPr lang="en-US" sz="1200" b="0" i="0" kern="1200" dirty="0">
-                <a:solidFill>
-                  <a:schemeClr val="tx1"/>
-                </a:solidFill>
-                <a:effectLst/>
-                <a:latin typeface="+mn-lt"/>
-                <a:ea typeface="+mn-ea"/>
-                <a:cs typeface="+mn-cs"/>
-              </a:rPr>
-              <a:t> library.</a:t>
-            </a:r>
-          </a:p>
-          <a:p>
-            <a:r>
-              <a:rPr lang="en-US" sz="1200" b="0" i="0" kern="1200" dirty="0">
-                <a:solidFill>
-                  <a:schemeClr val="tx1"/>
-                </a:solidFill>
-                <a:effectLst/>
-                <a:latin typeface="+mn-lt"/>
-                <a:ea typeface="+mn-ea"/>
-                <a:cs typeface="+mn-cs"/>
-              </a:rPr>
-              <a:t>4) Each component is described entirely through keyword attributes. Dash is </a:t>
-            </a:r>
-            <a:r>
-              <a:rPr lang="en-US" sz="1200" b="0" i="1" kern="1200" dirty="0">
-                <a:solidFill>
-                  <a:schemeClr val="tx1"/>
-                </a:solidFill>
-                <a:effectLst/>
-                <a:latin typeface="+mn-lt"/>
-                <a:ea typeface="+mn-ea"/>
-                <a:cs typeface="+mn-cs"/>
-              </a:rPr>
-              <a:t>declarative</a:t>
-            </a:r>
-            <a:r>
-              <a:rPr lang="en-US" sz="1200" b="0" i="0" kern="1200" dirty="0">
-                <a:solidFill>
-                  <a:schemeClr val="tx1"/>
-                </a:solidFill>
-                <a:effectLst/>
-                <a:latin typeface="+mn-lt"/>
-                <a:ea typeface="+mn-ea"/>
-                <a:cs typeface="+mn-cs"/>
-              </a:rPr>
-              <a:t>: you will primarily describe your application through these attributes.</a:t>
-            </a:r>
-          </a:p>
-          <a:p>
-            <a:r>
-              <a:rPr lang="en-US" sz="1200" b="0" i="0" kern="1200" dirty="0">
-                <a:solidFill>
-                  <a:schemeClr val="tx1"/>
-                </a:solidFill>
-                <a:effectLst/>
-                <a:latin typeface="+mn-lt"/>
-                <a:ea typeface="+mn-ea"/>
-                <a:cs typeface="+mn-cs"/>
-              </a:rPr>
-              <a:t>The children property is special. By convention, it's always the first attribute which means that you can omit it: html.H1(children='Hello Dash') is the same as html.H1('Hello Dash’). 5) Also, it can contain a string, a number, a single component, or a list of components.</a:t>
-            </a:r>
-          </a:p>
-          <a:p>
-            <a:r>
-              <a:rPr lang="en-US" sz="1200" b="0" i="0" kern="1200" dirty="0">
-                <a:solidFill>
-                  <a:schemeClr val="tx1"/>
-                </a:solidFill>
-                <a:effectLst/>
-                <a:latin typeface="+mn-lt"/>
-                <a:ea typeface="+mn-ea"/>
-                <a:cs typeface="+mn-cs"/>
-              </a:rPr>
-              <a:t>6) The fonts in your application will look a little bit different than what is displayed here. This application is using a custom CSS stylesheet to modify the default styles of the elements. You can learn more in the </a:t>
-            </a:r>
-            <a:r>
-              <a:rPr lang="en-US" sz="1200" b="0" i="0" u="sng" kern="1200" dirty="0">
-                <a:solidFill>
-                  <a:schemeClr val="tx1"/>
-                </a:solidFill>
-                <a:effectLst/>
-                <a:latin typeface="+mn-lt"/>
-                <a:ea typeface="+mn-ea"/>
-                <a:cs typeface="+mn-cs"/>
-                <a:hlinkClick r:id="rId3"/>
-              </a:rPr>
-              <a:t>css tutorial</a:t>
-            </a:r>
-            <a:r>
-              <a:rPr lang="en-US" sz="1200" b="0" i="0" kern="1200" dirty="0">
-                <a:solidFill>
-                  <a:schemeClr val="tx1"/>
-                </a:solidFill>
-                <a:effectLst/>
-                <a:latin typeface="+mn-lt"/>
-                <a:ea typeface="+mn-ea"/>
-                <a:cs typeface="+mn-cs"/>
-              </a:rPr>
-              <a:t>, but for now you can initialize your app with</a:t>
-            </a:r>
-          </a:p>
-          <a:p>
-            <a:r>
-              <a:rPr lang="en-US" dirty="0" err="1"/>
-              <a:t>external_stylesheets</a:t>
-            </a:r>
-            <a:r>
-              <a:rPr lang="en-US" dirty="0"/>
-              <a:t> = ['https://</a:t>
-            </a:r>
-            <a:r>
-              <a:rPr lang="en-US" dirty="0" err="1"/>
-              <a:t>codepen.io</a:t>
-            </a:r>
-            <a:r>
-              <a:rPr lang="en-US" dirty="0"/>
-              <a:t>/</a:t>
-            </a:r>
-            <a:r>
-              <a:rPr lang="en-US" dirty="0" err="1"/>
-              <a:t>chriddyp</a:t>
-            </a:r>
-            <a:r>
-              <a:rPr lang="en-US" dirty="0"/>
-              <a:t>/pen/</a:t>
-            </a:r>
-            <a:r>
-              <a:rPr lang="en-US" dirty="0" err="1"/>
-              <a:t>bWLwgP.css</a:t>
-            </a:r>
-            <a:r>
-              <a:rPr lang="en-US" dirty="0"/>
-              <a:t>'] </a:t>
-            </a:r>
-            <a:br>
-              <a:rPr lang="en-US" dirty="0"/>
-            </a:br>
-            <a:endParaRPr lang="en-US" dirty="0"/>
-          </a:p>
         </p:txBody>
       </p:sp>
       <p:sp>
@@ -3656,7 +4505,7 @@
           <a:p>
             <a:fld id="{8B9E4114-3C63-7747-8961-9652315A5F8D}" type="slidenum">
               <a:rPr lang="en-US" smtClean="0"/>
-              <a:t>14</a:t>
+              <a:t>13</a:t>
             </a:fld>
             <a:endParaRPr lang="en-US"/>
           </a:p>
@@ -3665,7 +4514,7 @@
     </p:spTree>
     <p:extLst>
       <p:ext uri="{BB962C8B-B14F-4D97-AF65-F5344CB8AC3E}">
-        <p14:creationId xmlns:p14="http://schemas.microsoft.com/office/powerpoint/2010/main" val="825756187"/>
+        <p14:creationId xmlns:p14="http://schemas.microsoft.com/office/powerpoint/2010/main" val="3511501003"/>
       </p:ext>
     </p:extLst>
   </p:cSld>
@@ -3720,51 +4569,294 @@
           <a:lstStyle/>
           <a:p>
             <a:r>
-              <a:rPr lang="en-US" dirty="0"/>
-              <a:t>Pattern:</a:t>
-            </a:r>
-          </a:p>
-          <a:p>
-            <a:r>
-              <a:rPr lang="en-US" dirty="0"/>
-              <a:t>1) Here is the concept</a:t>
-            </a:r>
-          </a:p>
-          <a:p>
-            <a:r>
-              <a:rPr lang="en-US" dirty="0"/>
-              <a:t>2) Here is the code</a:t>
-            </a:r>
-          </a:p>
-          <a:p>
-            <a:r>
-              <a:rPr lang="en-US" dirty="0"/>
-              <a:t>3) What do you think it will do?</a:t>
-            </a:r>
-          </a:p>
-          <a:p>
-            <a:r>
-              <a:rPr lang="en-US" dirty="0"/>
-              <a:t>4) Run it to see what it does</a:t>
-            </a:r>
-          </a:p>
-          <a:p>
-            <a:r>
-              <a:rPr lang="en-US" dirty="0"/>
-              <a:t>5) How did it do that?</a:t>
-            </a:r>
-          </a:p>
-          <a:p>
-            <a:endParaRPr lang="en-US" dirty="0"/>
-          </a:p>
-          <a:p>
-            <a:endParaRPr lang="en-US" dirty="0"/>
-          </a:p>
-          <a:p>
-            <a:r>
-              <a:rPr lang="en-US" dirty="0"/>
-              <a:t>I believe you learned about React this week so this should sound familiar</a:t>
-            </a:r>
+              <a:rPr lang="en-US" sz="1200" b="0" i="0" kern="1200" dirty="0">
+                <a:solidFill>
+                  <a:schemeClr val="tx1"/>
+                </a:solidFill>
+                <a:effectLst/>
+                <a:latin typeface="+mn-lt"/>
+                <a:ea typeface="+mn-ea"/>
+                <a:cs typeface="+mn-cs"/>
+              </a:rPr>
+              <a:t>1) The layout is composed of a tree of "components" like </a:t>
+            </a:r>
+            <a:r>
+              <a:rPr lang="en-US" sz="1200" b="0" i="0" kern="1200" dirty="0" err="1">
+                <a:solidFill>
+                  <a:schemeClr val="tx1"/>
+                </a:solidFill>
+                <a:effectLst/>
+                <a:latin typeface="+mn-lt"/>
+                <a:ea typeface="+mn-ea"/>
+                <a:cs typeface="+mn-cs"/>
+              </a:rPr>
+              <a:t>html.Div</a:t>
+            </a:r>
+            <a:r>
+              <a:rPr lang="en-US" sz="1200" b="0" i="0" kern="1200" dirty="0">
+                <a:solidFill>
+                  <a:schemeClr val="tx1"/>
+                </a:solidFill>
+                <a:effectLst/>
+                <a:latin typeface="+mn-lt"/>
+                <a:ea typeface="+mn-ea"/>
+                <a:cs typeface="+mn-cs"/>
+              </a:rPr>
+              <a:t> and </a:t>
+            </a:r>
+            <a:r>
+              <a:rPr lang="en-US" sz="1200" b="0" i="0" kern="1200" dirty="0" err="1">
+                <a:solidFill>
+                  <a:schemeClr val="tx1"/>
+                </a:solidFill>
+                <a:effectLst/>
+                <a:latin typeface="+mn-lt"/>
+                <a:ea typeface="+mn-ea"/>
+                <a:cs typeface="+mn-cs"/>
+              </a:rPr>
+              <a:t>dcc.Graph</a:t>
+            </a:r>
+            <a:r>
+              <a:rPr lang="en-US" sz="1200" b="0" i="0" kern="1200" dirty="0">
+                <a:solidFill>
+                  <a:schemeClr val="tx1"/>
+                </a:solidFill>
+                <a:effectLst/>
+                <a:latin typeface="+mn-lt"/>
+                <a:ea typeface="+mn-ea"/>
+                <a:cs typeface="+mn-cs"/>
+              </a:rPr>
+              <a:t>.</a:t>
+            </a:r>
+          </a:p>
+          <a:p>
+            <a:r>
+              <a:rPr lang="en-US" sz="1200" b="0" i="0" kern="1200" dirty="0">
+                <a:solidFill>
+                  <a:schemeClr val="tx1"/>
+                </a:solidFill>
+                <a:effectLst/>
+                <a:latin typeface="+mn-lt"/>
+                <a:ea typeface="+mn-ea"/>
+                <a:cs typeface="+mn-cs"/>
+              </a:rPr>
+              <a:t>2) The </a:t>
+            </a:r>
+            <a:r>
+              <a:rPr lang="en-US" sz="1200" b="0" i="0" kern="1200" dirty="0" err="1">
+                <a:solidFill>
+                  <a:schemeClr val="tx1"/>
+                </a:solidFill>
+                <a:effectLst/>
+                <a:latin typeface="+mn-lt"/>
+                <a:ea typeface="+mn-ea"/>
+                <a:cs typeface="+mn-cs"/>
+              </a:rPr>
+              <a:t>dash_html_components</a:t>
+            </a:r>
+            <a:r>
+              <a:rPr lang="en-US" sz="1200" b="0" i="0" kern="1200" dirty="0">
+                <a:solidFill>
+                  <a:schemeClr val="tx1"/>
+                </a:solidFill>
+                <a:effectLst/>
+                <a:latin typeface="+mn-lt"/>
+                <a:ea typeface="+mn-ea"/>
+                <a:cs typeface="+mn-cs"/>
+              </a:rPr>
+              <a:t> library has a component for every HTML tag. The html.H1(children='Hello Dash') component generates a &lt;h1&gt;Hello Dash&lt;/h1&gt; HTML element in your application.</a:t>
+            </a:r>
+          </a:p>
+          <a:p>
+            <a:r>
+              <a:rPr lang="en-US" sz="1200" b="0" i="0" kern="1200" dirty="0">
+                <a:solidFill>
+                  <a:schemeClr val="tx1"/>
+                </a:solidFill>
+                <a:effectLst/>
+                <a:latin typeface="+mn-lt"/>
+                <a:ea typeface="+mn-ea"/>
+                <a:cs typeface="+mn-cs"/>
+              </a:rPr>
+              <a:t>3) Not all components are pure HTML. The </a:t>
+            </a:r>
+            <a:r>
+              <a:rPr lang="en-US" sz="1200" b="0" i="0" kern="1200" dirty="0" err="1">
+                <a:solidFill>
+                  <a:schemeClr val="tx1"/>
+                </a:solidFill>
+                <a:effectLst/>
+                <a:latin typeface="+mn-lt"/>
+                <a:ea typeface="+mn-ea"/>
+                <a:cs typeface="+mn-cs"/>
+              </a:rPr>
+              <a:t>dash_core_components</a:t>
+            </a:r>
+            <a:r>
+              <a:rPr lang="en-US" sz="1200" b="0" i="0" kern="1200" dirty="0">
+                <a:solidFill>
+                  <a:schemeClr val="tx1"/>
+                </a:solidFill>
+                <a:effectLst/>
+                <a:latin typeface="+mn-lt"/>
+                <a:ea typeface="+mn-ea"/>
+                <a:cs typeface="+mn-cs"/>
+              </a:rPr>
+              <a:t> describe higher-level components that are interactive and are generated with JavaScript, HTML, and CSS through the </a:t>
+            </a:r>
+            <a:r>
+              <a:rPr lang="en-US" sz="1200" b="0" i="0" kern="1200" dirty="0" err="1">
+                <a:solidFill>
+                  <a:schemeClr val="tx1"/>
+                </a:solidFill>
+                <a:effectLst/>
+                <a:latin typeface="+mn-lt"/>
+                <a:ea typeface="+mn-ea"/>
+                <a:cs typeface="+mn-cs"/>
+              </a:rPr>
+              <a:t>React.js</a:t>
+            </a:r>
+            <a:r>
+              <a:rPr lang="en-US" sz="1200" b="0" i="0" kern="1200" dirty="0">
+                <a:solidFill>
+                  <a:schemeClr val="tx1"/>
+                </a:solidFill>
+                <a:effectLst/>
+                <a:latin typeface="+mn-lt"/>
+                <a:ea typeface="+mn-ea"/>
+                <a:cs typeface="+mn-cs"/>
+              </a:rPr>
+              <a:t> library.</a:t>
+            </a:r>
+          </a:p>
+          <a:p>
+            <a:r>
+              <a:rPr lang="en-US" sz="1200" b="0" i="0" kern="1200" dirty="0">
+                <a:solidFill>
+                  <a:schemeClr val="tx1"/>
+                </a:solidFill>
+                <a:effectLst/>
+                <a:latin typeface="+mn-lt"/>
+                <a:ea typeface="+mn-ea"/>
+                <a:cs typeface="+mn-cs"/>
+              </a:rPr>
+              <a:t>4) Each component is described entirely through keyword attributes. Dash is </a:t>
+            </a:r>
+            <a:r>
+              <a:rPr lang="en-US" sz="1200" b="0" i="1" kern="1200" dirty="0">
+                <a:solidFill>
+                  <a:schemeClr val="tx1"/>
+                </a:solidFill>
+                <a:effectLst/>
+                <a:latin typeface="+mn-lt"/>
+                <a:ea typeface="+mn-ea"/>
+                <a:cs typeface="+mn-cs"/>
+              </a:rPr>
+              <a:t>declarative</a:t>
+            </a:r>
+            <a:r>
+              <a:rPr lang="en-US" sz="1200" b="0" i="0" kern="1200" dirty="0">
+                <a:solidFill>
+                  <a:schemeClr val="tx1"/>
+                </a:solidFill>
+                <a:effectLst/>
+                <a:latin typeface="+mn-lt"/>
+                <a:ea typeface="+mn-ea"/>
+                <a:cs typeface="+mn-cs"/>
+              </a:rPr>
+              <a:t>: you will primarily describe your application through these attributes.</a:t>
+            </a:r>
+          </a:p>
+          <a:p>
+            <a:r>
+              <a:rPr lang="en-US" sz="1200" b="0" i="0" kern="1200" dirty="0">
+                <a:solidFill>
+                  <a:schemeClr val="tx1"/>
+                </a:solidFill>
+                <a:effectLst/>
+                <a:latin typeface="+mn-lt"/>
+                <a:ea typeface="+mn-ea"/>
+                <a:cs typeface="+mn-cs"/>
+              </a:rPr>
+              <a:t>The children property is special. By convention, it's always the first attribute which means that you can omit it: html.H1(children='Hello Dash') is the same as html.H1('Hello Dash’). 5) Also, it can contain a string, a number, a single component, or a list of components.</a:t>
+            </a:r>
+          </a:p>
+          <a:p>
+            <a:r>
+              <a:rPr lang="en-US" sz="1200" b="0" i="0" kern="1200" dirty="0">
+                <a:solidFill>
+                  <a:schemeClr val="tx1"/>
+                </a:solidFill>
+                <a:effectLst/>
+                <a:latin typeface="+mn-lt"/>
+                <a:ea typeface="+mn-ea"/>
+                <a:cs typeface="+mn-cs"/>
+              </a:rPr>
+              <a:t>6) The fonts in your application will look a little bit different than what is displayed here. This application is using a custom CSS stylesheet to modify the default styles of the elements. You can learn more in the </a:t>
+            </a:r>
+            <a:r>
+              <a:rPr lang="en-US" sz="1200" b="0" i="0" u="sng" kern="1200" dirty="0">
+                <a:solidFill>
+                  <a:schemeClr val="tx1"/>
+                </a:solidFill>
+                <a:effectLst/>
+                <a:latin typeface="+mn-lt"/>
+                <a:ea typeface="+mn-ea"/>
+                <a:cs typeface="+mn-cs"/>
+                <a:hlinkClick r:id="rId3"/>
+              </a:rPr>
+              <a:t>css tutorial</a:t>
+            </a:r>
+            <a:r>
+              <a:rPr lang="en-US" sz="1200" b="0" i="0" kern="1200" dirty="0">
+                <a:solidFill>
+                  <a:schemeClr val="tx1"/>
+                </a:solidFill>
+                <a:effectLst/>
+                <a:latin typeface="+mn-lt"/>
+                <a:ea typeface="+mn-ea"/>
+                <a:cs typeface="+mn-cs"/>
+              </a:rPr>
+              <a:t>, but for now you can initialize your app with</a:t>
+            </a:r>
+          </a:p>
+          <a:p>
+            <a:r>
+              <a:rPr lang="en-US" dirty="0" err="1"/>
+              <a:t>external_stylesheets</a:t>
+            </a:r>
+            <a:r>
+              <a:rPr lang="en-US" dirty="0"/>
+              <a:t> = ['https://</a:t>
+            </a:r>
+            <a:r>
+              <a:rPr lang="en-US" dirty="0" err="1"/>
+              <a:t>codepen.io</a:t>
+            </a:r>
+            <a:r>
+              <a:rPr lang="en-US" dirty="0"/>
+              <a:t>/</a:t>
+            </a:r>
+            <a:r>
+              <a:rPr lang="en-US" dirty="0" err="1"/>
+              <a:t>chriddyp</a:t>
+            </a:r>
+            <a:r>
+              <a:rPr lang="en-US" dirty="0"/>
+              <a:t>/pen/</a:t>
+            </a:r>
+            <a:r>
+              <a:rPr lang="en-US" dirty="0" err="1"/>
+              <a:t>bWLwgP.css</a:t>
+            </a:r>
+            <a:r>
+              <a:rPr lang="en-US" dirty="0"/>
+              <a:t>'] </a:t>
+            </a:r>
+            <a:br>
+              <a:rPr lang="en-US" dirty="0"/>
+            </a:br>
+            <a:endParaRPr lang="en-US" dirty="0"/>
           </a:p>
         </p:txBody>
       </p:sp>
@@ -3785,7 +4877,7 @@
           <a:p>
             <a:fld id="{8B9E4114-3C63-7747-8961-9652315A5F8D}" type="slidenum">
               <a:rPr lang="en-US" smtClean="0"/>
-              <a:t>15</a:t>
+              <a:t>14</a:t>
             </a:fld>
             <a:endParaRPr lang="en-US"/>
           </a:p>
@@ -3794,7 +4886,7 @@
     </p:spTree>
     <p:extLst>
       <p:ext uri="{BB962C8B-B14F-4D97-AF65-F5344CB8AC3E}">
-        <p14:creationId xmlns:p14="http://schemas.microsoft.com/office/powerpoint/2010/main" val="2370781854"/>
+        <p14:creationId xmlns:p14="http://schemas.microsoft.com/office/powerpoint/2010/main" val="825756187"/>
       </p:ext>
     </p:extLst>
   </p:cSld>
@@ -11061,7 +12153,7 @@
             </a:pPr>
             <a:r>
               <a:rPr lang="en-US" dirty="0"/>
-              <a:t>Run and examine </a:t>
+              <a:t>Examine and then run </a:t>
             </a:r>
             <a:r>
               <a:rPr lang="en-US" dirty="0" err="1"/>
@@ -11085,7 +12177,7 @@
             </a:pPr>
             <a:r>
               <a:rPr lang="en-US" dirty="0"/>
-              <a:t>Run and examine </a:t>
+              <a:t>Examine and then run </a:t>
             </a:r>
             <a:r>
               <a:rPr lang="en-US" dirty="0" err="1"/>
@@ -11110,7 +12202,7 @@
             </a:pPr>
             <a:r>
               <a:rPr lang="en-US" dirty="0"/>
-              <a:t>Run and examine </a:t>
+              <a:t>Examine and then run </a:t>
             </a:r>
             <a:r>
               <a:rPr lang="en-US" dirty="0" err="1"/>
@@ -11582,7 +12674,7 @@
           <a:p>
             <a:r>
               <a:rPr lang="en-US" dirty="0"/>
-              <a:t>Run and examine </a:t>
+              <a:t>Examine and then run </a:t>
             </a:r>
             <a:r>
               <a:rPr lang="en-US" dirty="0" err="1"/>
@@ -11690,7 +12782,7 @@
           <a:p>
             <a:r>
               <a:rPr lang="en-US" dirty="0"/>
-              <a:t>Run and examine </a:t>
+              <a:t>Examine and then run </a:t>
             </a:r>
             <a:r>
               <a:rPr lang="en-US" dirty="0" err="1"/>
@@ -11725,7 +12817,15 @@
             </a:pPr>
             <a:r>
               <a:rPr lang="en-US" dirty="0"/>
-              <a:t>Make sure the Input is being pass into the callback.</a:t>
+              <a:t>Make sure the Input is being pass into the callback (edit </a:t>
+            </a:r>
+            <a:r>
+              <a:rPr lang="en-US" dirty="0" err="1"/>
+              <a:t>slider.py</a:t>
+            </a:r>
+            <a:r>
+              <a:rPr lang="en-US" dirty="0"/>
+              <a:t>) </a:t>
             </a:r>
           </a:p>
           <a:p>
@@ -11757,7 +12857,15 @@
             </a:r>
             <a:r>
               <a:rPr lang="en-US" dirty="0"/>
-              <a:t>. </a:t>
+              <a:t> (edit </a:t>
+            </a:r>
+            <a:r>
+              <a:rPr lang="en-US" dirty="0" err="1"/>
+              <a:t>slider.py</a:t>
+            </a:r>
+            <a:r>
+              <a:rPr lang="en-US" dirty="0"/>
+              <a:t>)</a:t>
             </a:r>
           </a:p>
           <a:p>
@@ -11866,7 +12974,7 @@
             </a:pPr>
             <a:r>
               <a:rPr lang="en-US" dirty="0"/>
-              <a:t>Run and examine </a:t>
+              <a:t>Examine and then run </a:t>
             </a:r>
             <a:r>
               <a:rPr lang="en-US" dirty="0" err="1"/>
@@ -11890,7 +12998,7 @@
             </a:pPr>
             <a:r>
               <a:rPr lang="en-US" dirty="0"/>
-              <a:t>Run and examine </a:t>
+              <a:t>Examine and then run </a:t>
             </a:r>
             <a:r>
               <a:rPr lang="en-US" dirty="0" err="1"/>
@@ -11912,7 +13020,7 @@
             </a:pPr>
             <a:r>
               <a:rPr lang="en-US" dirty="0"/>
-              <a:t>Run and examine </a:t>
+              <a:t>Examine and then run </a:t>
             </a:r>
             <a:r>
               <a:rPr lang="en-US" dirty="0" err="1"/>
@@ -12121,7 +13229,7 @@
           <a:p>
             <a:r>
               <a:rPr lang="en-US" dirty="0"/>
-              <a:t>Run and examine </a:t>
+              <a:t>Examine and then run </a:t>
             </a:r>
             <a:r>
               <a:rPr lang="en-US" dirty="0" err="1"/>
@@ -12150,7 +13258,7 @@
             </a:r>
             <a:r>
               <a:rPr lang="en-US" dirty="0"/>
-              <a:t> updates the string when the user hits submit. Run and examine </a:t>
+              <a:t> updates the string when the user hits submit. Examine and then run </a:t>
             </a:r>
             <a:r>
               <a:rPr lang="en-US" dirty="0" err="1"/>
@@ -12190,13 +13298,8 @@
             </a:r>
             <a:r>
               <a:rPr lang="en-US" dirty="0"/>
-              <a:t> updates when the user </a:t>
-            </a:r>
-            <a:r>
-              <a:rPr lang="en-US"/>
-              <a:t>hits submit.</a:t>
-            </a:r>
-            <a:endParaRPr lang="en-US" dirty="0"/>
+              <a:t> updates when the user hits submit.</a:t>
+            </a:r>
           </a:p>
           <a:p>
             <a:endParaRPr lang="en-US" dirty="0"/>
@@ -12333,7 +13436,20 @@
             <a:endParaRPr lang="en-US" dirty="0"/>
           </a:p>
           <a:p>
-            <a:endParaRPr lang="en-US" dirty="0"/>
+            <a:pPr marL="457200" lvl="1" indent="0">
+              <a:buNone/>
+            </a:pPr>
+            <a:endParaRPr lang="en-US" dirty="0"/>
+          </a:p>
+          <a:p>
+            <a:r>
+              <a:rPr lang="en-US" dirty="0" err="1"/>
+              <a:t>Crossfiltering</a:t>
+            </a:r>
+            <a:r>
+              <a:rPr lang="en-US" dirty="0"/>
+              <a:t> is filtering the results in one graph based on selection in another</a:t>
+            </a:r>
           </a:p>
           <a:p>
             <a:endParaRPr lang="en-US" dirty="0"/>
@@ -12375,7 +13491,7 @@
           <p:cNvPr id="2" name="Title 1">
             <a:extLst>
               <a:ext uri="{FF2B5EF4-FFF2-40B4-BE49-F238E27FC236}">
-                <a16:creationId xmlns:a16="http://schemas.microsoft.com/office/drawing/2014/main" id="{515259CD-C84D-9447-A5B8-13B9C7E99C95}"/>
+                <a16:creationId xmlns:a16="http://schemas.microsoft.com/office/drawing/2014/main" id="{2FB7F87C-62E9-9249-A799-F186C5CBD12B}"/>
               </a:ext>
             </a:extLst>
           </p:cNvPr>
@@ -12393,7 +13509,7 @@
           <a:p>
             <a:r>
               <a:rPr lang="en-US" dirty="0"/>
-              <a:t>Geographic Mapping</a:t>
+              <a:t>Assignment 8</a:t>
             </a:r>
           </a:p>
         </p:txBody>
@@ -12403,7 +13519,7 @@
           <p:cNvPr id="3" name="Content Placeholder 2">
             <a:extLst>
               <a:ext uri="{FF2B5EF4-FFF2-40B4-BE49-F238E27FC236}">
-                <a16:creationId xmlns:a16="http://schemas.microsoft.com/office/drawing/2014/main" id="{5452DE67-7A02-0D45-8DC1-2AD2FC1E9469}"/>
+                <a16:creationId xmlns:a16="http://schemas.microsoft.com/office/drawing/2014/main" id="{88168EB6-9EB1-2743-A7F7-F4FE9749654D}"/>
               </a:ext>
             </a:extLst>
           </p:cNvPr>
@@ -12421,30 +13537,83 @@
           <a:p>
             <a:r>
               <a:rPr lang="en-US" dirty="0"/>
-              <a:t>TODO</a:t>
-            </a:r>
-          </a:p>
-          <a:p>
-            <a:endParaRPr lang="en-US" dirty="0"/>
-          </a:p>
-          <a:p>
-            <a:endParaRPr lang="en-US" dirty="0"/>
-          </a:p>
-          <a:p>
-            <a:endParaRPr lang="en-US" dirty="0"/>
-          </a:p>
-          <a:p>
-            <a:r>
-              <a:rPr lang="en-US" dirty="0"/>
-              <a:t>Practice Example..</a:t>
-            </a:r>
+              <a:t>Examine and then run </a:t>
+            </a:r>
+            <a:r>
+              <a:rPr lang="en-US" dirty="0" err="1"/>
+              <a:t>four_attributes.py</a:t>
+            </a:r>
+            <a:endParaRPr lang="en-US" dirty="0"/>
+          </a:p>
+          <a:p>
+            <a:endParaRPr lang="en-US" dirty="0"/>
+          </a:p>
+          <a:p>
+            <a:r>
+              <a:rPr lang="en-US" dirty="0"/>
+              <a:t>Examine and then run </a:t>
+            </a:r>
+            <a:r>
+              <a:rPr lang="en-US" dirty="0" err="1"/>
+              <a:t>update_graph_on_hover.py</a:t>
+            </a:r>
+            <a:endParaRPr lang="en-US" dirty="0"/>
+          </a:p>
+          <a:p>
+            <a:endParaRPr lang="en-US" dirty="0"/>
+          </a:p>
+          <a:p>
+            <a:r>
+              <a:rPr lang="en-US" dirty="0"/>
+              <a:t>Examine and then run </a:t>
+            </a:r>
+            <a:r>
+              <a:rPr lang="en-US" dirty="0" err="1"/>
+              <a:t>cross_filter.py</a:t>
+            </a:r>
+            <a:endParaRPr lang="en-US" dirty="0"/>
+          </a:p>
+          <a:p>
+            <a:pPr marL="800100" lvl="1" indent="-342900">
+              <a:buFont typeface="+mj-lt"/>
+              <a:buAutoNum type="alphaLcParenR"/>
+            </a:pPr>
+            <a:r>
+              <a:rPr lang="en-US" dirty="0"/>
+              <a:t>What does the ”highlight” function return?</a:t>
+            </a:r>
+          </a:p>
+          <a:p>
+            <a:pPr marL="800100" lvl="1" indent="-342900">
+              <a:buFont typeface="+mj-lt"/>
+              <a:buAutoNum type="alphaLcParenR"/>
+            </a:pPr>
+            <a:r>
+              <a:rPr lang="en-US" dirty="0"/>
+              <a:t>What is the input argument to </a:t>
+            </a:r>
+            <a:r>
+              <a:rPr lang="en-US" dirty="0" err="1"/>
+              <a:t>app.callback</a:t>
+            </a:r>
+            <a:r>
+              <a:rPr lang="en-US" dirty="0"/>
+              <a:t>?</a:t>
+            </a:r>
+          </a:p>
+          <a:p>
+            <a:pPr>
+              <a:buFont typeface="+mj-lt"/>
+              <a:buAutoNum type="alphaLcParenR"/>
+            </a:pPr>
+            <a:endParaRPr lang="en-US" dirty="0"/>
           </a:p>
         </p:txBody>
       </p:sp>
     </p:spTree>
     <p:extLst>
       <p:ext uri="{BB962C8B-B14F-4D97-AF65-F5344CB8AC3E}">
-        <p14:creationId xmlns:p14="http://schemas.microsoft.com/office/powerpoint/2010/main" val="980576787"/>
+        <p14:creationId xmlns:p14="http://schemas.microsoft.com/office/powerpoint/2010/main" val="2330722169"/>
       </p:ext>
     </p:extLst>
   </p:cSld>
@@ -12476,7 +13645,7 @@
           <p:cNvPr id="2" name="Title 1">
             <a:extLst>
               <a:ext uri="{FF2B5EF4-FFF2-40B4-BE49-F238E27FC236}">
-                <a16:creationId xmlns:a16="http://schemas.microsoft.com/office/drawing/2014/main" id="{F5ECC3B4-A5B1-364A-9BD6-493AE3505276}"/>
+                <a16:creationId xmlns:a16="http://schemas.microsoft.com/office/drawing/2014/main" id="{515259CD-C84D-9447-A5B8-13B9C7E99C95}"/>
               </a:ext>
             </a:extLst>
           </p:cNvPr>
@@ -12494,7 +13663,7 @@
           <a:p>
             <a:r>
               <a:rPr lang="en-US" dirty="0"/>
-              <a:t>Predicting Customer Behavior with Crystal LSTM and Visualizing with Dash</a:t>
+              <a:t>Geographic Mapping</a:t>
             </a:r>
           </a:p>
         </p:txBody>
@@ -12504,7 +13673,7 @@
           <p:cNvPr id="3" name="Content Placeholder 2">
             <a:extLst>
               <a:ext uri="{FF2B5EF4-FFF2-40B4-BE49-F238E27FC236}">
-                <a16:creationId xmlns:a16="http://schemas.microsoft.com/office/drawing/2014/main" id="{FF60B526-BE54-234C-8827-248A0688E219}"/>
+                <a16:creationId xmlns:a16="http://schemas.microsoft.com/office/drawing/2014/main" id="{5452DE67-7A02-0D45-8DC1-2AD2FC1E9469}"/>
               </a:ext>
             </a:extLst>
           </p:cNvPr>
@@ -12521,55 +13690,58 @@
           <a:lstStyle/>
           <a:p>
             <a:r>
-              <a:rPr lang="en-US" dirty="0"/>
-              <a:t>Crystal is an application of LSTM to predict </a:t>
-            </a:r>
-            <a:r>
-              <a:rPr lang="en-US" b="1" dirty="0"/>
-              <a:t>what</a:t>
-            </a:r>
-            <a:r>
-              <a:rPr lang="en-US" dirty="0"/>
-              <a:t> a consumer will purchase in their next “basket” and </a:t>
-            </a:r>
-            <a:r>
-              <a:rPr lang="en-US" b="1" dirty="0"/>
-              <a:t>when</a:t>
-            </a:r>
-            <a:r>
-              <a:rPr lang="en-US" dirty="0"/>
-              <a:t> the purchase will happen</a:t>
-            </a:r>
+              <a:rPr lang="en-US" dirty="0" err="1"/>
+              <a:t>Plotly</a:t>
+            </a:r>
+            <a:r>
+              <a:rPr lang="en-US" dirty="0"/>
+              <a:t> has a variety of maps to choose from in </a:t>
+            </a:r>
+            <a:r>
+              <a:rPr lang="en-US" dirty="0" err="1"/>
+              <a:t>Mapbox</a:t>
+            </a:r>
+            <a:endParaRPr lang="en-US" dirty="0"/>
           </a:p>
           <a:p>
             <a:pPr lvl="1"/>
             <a:r>
               <a:rPr lang="en-US" dirty="0"/>
-              <a:t>https://</a:t>
+              <a:t>You need a </a:t>
             </a:r>
             <a:r>
               <a:rPr lang="en-US" dirty="0" err="1"/>
-              <a:t>medium.com</a:t>
-            </a:r>
-            <a:r>
-              <a:rPr lang="en-US" dirty="0"/>
-              <a:t>/</a:t>
+              <a:t>Mapbox</a:t>
+            </a:r>
+            <a:r>
+              <a:rPr lang="en-US" dirty="0"/>
+              <a:t> Access Token to access a </a:t>
             </a:r>
             <a:r>
               <a:rPr lang="en-US" dirty="0" err="1"/>
-              <a:t>bcggamma</a:t>
-            </a:r>
-            <a:r>
-              <a:rPr lang="en-US" dirty="0"/>
-              <a:t>/using-deep-learning-to-predict-not-just-what-but-when-fae6515acb1b</a:t>
-            </a:r>
+              <a:t>mapbox</a:t>
+            </a:r>
+            <a:r>
+              <a:rPr lang="en-US" dirty="0"/>
+              <a:t> map</a:t>
+            </a:r>
+          </a:p>
+          <a:p>
+            <a:pPr lvl="1"/>
+            <a:r>
+              <a:rPr lang="en-US" dirty="0">
+                <a:hlinkClick r:id="rId3"/>
+              </a:rPr>
+              <a:t>https://plot.ly/python/scattermapbox/</a:t>
+            </a:r>
+            <a:endParaRPr lang="en-US" dirty="0"/>
           </a:p>
         </p:txBody>
       </p:sp>
     </p:spTree>
     <p:extLst>
       <p:ext uri="{BB962C8B-B14F-4D97-AF65-F5344CB8AC3E}">
-        <p14:creationId xmlns:p14="http://schemas.microsoft.com/office/powerpoint/2010/main" val="975091132"/>
+        <p14:creationId xmlns:p14="http://schemas.microsoft.com/office/powerpoint/2010/main" val="980576787"/>
       </p:ext>
     </p:extLst>
   </p:cSld>
@@ -12601,7 +13773,7 @@
           <p:cNvPr id="2" name="Title 1">
             <a:extLst>
               <a:ext uri="{FF2B5EF4-FFF2-40B4-BE49-F238E27FC236}">
-                <a16:creationId xmlns:a16="http://schemas.microsoft.com/office/drawing/2014/main" id="{4BD8762B-C49F-DD49-91CF-D85651CC3A8F}"/>
+                <a16:creationId xmlns:a16="http://schemas.microsoft.com/office/drawing/2014/main" id="{16793745-F287-714A-BDFC-989F8F02CF79}"/>
               </a:ext>
             </a:extLst>
           </p:cNvPr>
@@ -12619,7 +13791,7 @@
           <a:p>
             <a:r>
               <a:rPr lang="en-US" dirty="0"/>
-              <a:t>Dash Bio</a:t>
+              <a:t>Assignment 9</a:t>
             </a:r>
           </a:p>
         </p:txBody>
@@ -12629,7 +13801,7 @@
           <p:cNvPr id="3" name="Content Placeholder 2">
             <a:extLst>
               <a:ext uri="{FF2B5EF4-FFF2-40B4-BE49-F238E27FC236}">
-                <a16:creationId xmlns:a16="http://schemas.microsoft.com/office/drawing/2014/main" id="{1776B270-B2FA-D54C-B93F-D8A045D213D4}"/>
+                <a16:creationId xmlns:a16="http://schemas.microsoft.com/office/drawing/2014/main" id="{94D418AE-796C-8E4D-B446-AF7A6793C759}"/>
               </a:ext>
             </a:extLst>
           </p:cNvPr>
@@ -12647,7 +13819,59 @@
           <a:p>
             <a:r>
               <a:rPr lang="en-US" dirty="0"/>
-              <a:t>TODO</a:t>
+              <a:t>Examine and then run </a:t>
+            </a:r>
+            <a:r>
+              <a:rPr lang="en-US" dirty="0" err="1"/>
+              <a:t>walmart.py</a:t>
+            </a:r>
+            <a:endParaRPr lang="en-US" dirty="0"/>
+          </a:p>
+          <a:p>
+            <a:endParaRPr lang="en-US" dirty="0"/>
+          </a:p>
+          <a:p>
+            <a:r>
+              <a:rPr lang="en-US" dirty="0"/>
+              <a:t>Your task is to use </a:t>
+            </a:r>
+            <a:r>
+              <a:rPr lang="en-US" dirty="0" err="1"/>
+              <a:t>hoverData</a:t>
+            </a:r>
+            <a:r>
+              <a:rPr lang="en-US" dirty="0"/>
+              <a:t> in the callback in order to display the correct string to the user</a:t>
+            </a:r>
+          </a:p>
+          <a:p>
+            <a:pPr lvl="1"/>
+            <a:r>
+              <a:rPr lang="en-US" dirty="0"/>
+              <a:t>Hint #1: </a:t>
+            </a:r>
+            <a:r>
+              <a:rPr lang="en-US" dirty="0" err="1"/>
+              <a:t>hoverData</a:t>
+            </a:r>
+            <a:r>
+              <a:rPr lang="en-US" dirty="0"/>
+              <a:t> has a key ‘points’</a:t>
+            </a:r>
+          </a:p>
+          <a:p>
+            <a:pPr lvl="1"/>
+            <a:r>
+              <a:rPr lang="en-US" dirty="0"/>
+              <a:t>Hint #2: In the figure in the Graph you can set a field called ‘</a:t>
+            </a:r>
+            <a:r>
+              <a:rPr lang="en-US" dirty="0" err="1"/>
+              <a:t>customdata</a:t>
+            </a:r>
+            <a:r>
+              <a:rPr lang="en-US" dirty="0"/>
+              <a:t>’ within the data section. This is already being done for you, but how can you use it?</a:t>
             </a:r>
           </a:p>
         </p:txBody>
@@ -12655,7 +13879,7 @@
     </p:spTree>
     <p:extLst>
       <p:ext uri="{BB962C8B-B14F-4D97-AF65-F5344CB8AC3E}">
-        <p14:creationId xmlns:p14="http://schemas.microsoft.com/office/powerpoint/2010/main" val="1079965410"/>
+        <p14:creationId xmlns:p14="http://schemas.microsoft.com/office/powerpoint/2010/main" val="2839586076"/>
       </p:ext>
     </p:extLst>
   </p:cSld>
@@ -12687,7 +13911,7 @@
           <p:cNvPr id="2" name="Title 1">
             <a:extLst>
               <a:ext uri="{FF2B5EF4-FFF2-40B4-BE49-F238E27FC236}">
-                <a16:creationId xmlns:a16="http://schemas.microsoft.com/office/drawing/2014/main" id="{B14A6EC7-4813-9643-8258-F824400A49A4}"/>
+                <a16:creationId xmlns:a16="http://schemas.microsoft.com/office/drawing/2014/main" id="{F5ECC3B4-A5B1-364A-9BD6-493AE3505276}"/>
               </a:ext>
             </a:extLst>
           </p:cNvPr>
@@ -12705,7 +13929,7 @@
           <a:p>
             <a:r>
               <a:rPr lang="en-US" dirty="0"/>
-              <a:t>Final Challenge</a:t>
+              <a:t>Predicting Customer Behavior with Crystal LSTM and Visualizing with Dash</a:t>
             </a:r>
           </a:p>
         </p:txBody>
@@ -12715,7 +13939,7 @@
           <p:cNvPr id="3" name="Content Placeholder 2">
             <a:extLst>
               <a:ext uri="{FF2B5EF4-FFF2-40B4-BE49-F238E27FC236}">
-                <a16:creationId xmlns:a16="http://schemas.microsoft.com/office/drawing/2014/main" id="{E3CCDB5F-1C82-EC49-B95F-4C7310374CE3}"/>
+                <a16:creationId xmlns:a16="http://schemas.microsoft.com/office/drawing/2014/main" id="{FF60B526-BE54-234C-8827-248A0688E219}"/>
               </a:ext>
             </a:extLst>
           </p:cNvPr>
@@ -12733,7 +13957,46 @@
           <a:p>
             <a:r>
               <a:rPr lang="en-US" dirty="0"/>
-              <a:t>TODO</a:t>
+              <a:t>Crystal is an application of LSTM to predict </a:t>
+            </a:r>
+            <a:r>
+              <a:rPr lang="en-US" b="1" dirty="0"/>
+              <a:t>what</a:t>
+            </a:r>
+            <a:r>
+              <a:rPr lang="en-US" dirty="0"/>
+              <a:t> a consumer will purchase in their next “basket” and </a:t>
+            </a:r>
+            <a:r>
+              <a:rPr lang="en-US" b="1" dirty="0"/>
+              <a:t>when</a:t>
+            </a:r>
+            <a:r>
+              <a:rPr lang="en-US" dirty="0"/>
+              <a:t> the purchase will happen</a:t>
+            </a:r>
+          </a:p>
+          <a:p>
+            <a:pPr lvl="1"/>
+            <a:r>
+              <a:rPr lang="en-US" dirty="0"/>
+              <a:t>https://</a:t>
+            </a:r>
+            <a:r>
+              <a:rPr lang="en-US" dirty="0" err="1"/>
+              <a:t>medium.com</a:t>
+            </a:r>
+            <a:r>
+              <a:rPr lang="en-US" dirty="0"/>
+              <a:t>/</a:t>
+            </a:r>
+            <a:r>
+              <a:rPr lang="en-US" dirty="0" err="1"/>
+              <a:t>bcggamma</a:t>
+            </a:r>
+            <a:r>
+              <a:rPr lang="en-US" dirty="0"/>
+              <a:t>/using-deep-learning-to-predict-not-just-what-but-when-fae6515acb1b</a:t>
             </a:r>
           </a:p>
         </p:txBody>
@@ -12741,7 +14004,7 @@
     </p:spTree>
     <p:extLst>
       <p:ext uri="{BB962C8B-B14F-4D97-AF65-F5344CB8AC3E}">
-        <p14:creationId xmlns:p14="http://schemas.microsoft.com/office/powerpoint/2010/main" val="3294668775"/>
+        <p14:creationId xmlns:p14="http://schemas.microsoft.com/office/powerpoint/2010/main" val="975091132"/>
       </p:ext>
     </p:extLst>
   </p:cSld>
@@ -12915,6 +14178,92 @@
           <p:cNvPr id="2" name="Title 1">
             <a:extLst>
               <a:ext uri="{FF2B5EF4-FFF2-40B4-BE49-F238E27FC236}">
+                <a16:creationId xmlns:a16="http://schemas.microsoft.com/office/drawing/2014/main" id="{4BD8762B-C49F-DD49-91CF-D85651CC3A8F}"/>
+              </a:ext>
+            </a:extLst>
+          </p:cNvPr>
+          <p:cNvSpPr>
+            <a:spLocks noGrp="1"/>
+          </p:cNvSpPr>
+          <p:nvPr>
+            <p:ph type="title"/>
+          </p:nvPr>
+        </p:nvSpPr>
+        <p:spPr/>
+        <p:txBody>
+          <a:bodyPr/>
+          <a:lstStyle/>
+          <a:p>
+            <a:r>
+              <a:rPr lang="en-US" dirty="0"/>
+              <a:t>Dash Bio</a:t>
+            </a:r>
+          </a:p>
+        </p:txBody>
+      </p:sp>
+      <p:sp>
+        <p:nvSpPr>
+          <p:cNvPr id="3" name="Content Placeholder 2">
+            <a:extLst>
+              <a:ext uri="{FF2B5EF4-FFF2-40B4-BE49-F238E27FC236}">
+                <a16:creationId xmlns:a16="http://schemas.microsoft.com/office/drawing/2014/main" id="{1776B270-B2FA-D54C-B93F-D8A045D213D4}"/>
+              </a:ext>
+            </a:extLst>
+          </p:cNvPr>
+          <p:cNvSpPr>
+            <a:spLocks noGrp="1"/>
+          </p:cNvSpPr>
+          <p:nvPr>
+            <p:ph idx="1"/>
+          </p:nvPr>
+        </p:nvSpPr>
+        <p:spPr/>
+        <p:txBody>
+          <a:bodyPr/>
+          <a:lstStyle/>
+          <a:p>
+            <a:r>
+              <a:rPr lang="en-US" dirty="0"/>
+              <a:t>Dash recently added a library of bioinformatics components..</a:t>
+            </a:r>
+          </a:p>
+        </p:txBody>
+      </p:sp>
+    </p:spTree>
+    <p:extLst>
+      <p:ext uri="{BB962C8B-B14F-4D97-AF65-F5344CB8AC3E}">
+        <p14:creationId xmlns:p14="http://schemas.microsoft.com/office/powerpoint/2010/main" val="1079965410"/>
+      </p:ext>
+    </p:extLst>
+  </p:cSld>
+  <p:clrMapOvr>
+    <a:masterClrMapping/>
+  </p:clrMapOvr>
+</p:sld>
+</file>
+
+<file path=ppt/slides/slide31.xml><?xml version="1.0" encoding="utf-8"?>
+<p:sld xmlns:a="http://schemas.openxmlformats.org/drawingml/2006/main" xmlns:r="http://schemas.openxmlformats.org/officeDocument/2006/relationships" xmlns:p="http://schemas.openxmlformats.org/presentationml/2006/main">
+  <p:cSld>
+    <p:spTree>
+      <p:nvGrpSpPr>
+        <p:cNvPr id="1" name=""/>
+        <p:cNvGrpSpPr/>
+        <p:nvPr/>
+      </p:nvGrpSpPr>
+      <p:grpSpPr>
+        <a:xfrm>
+          <a:off x="0" y="0"/>
+          <a:ext cx="0" cy="0"/>
+          <a:chOff x="0" y="0"/>
+          <a:chExt cx="0" cy="0"/>
+        </a:xfrm>
+      </p:grpSpPr>
+      <p:sp>
+        <p:nvSpPr>
+          <p:cNvPr id="2" name="Title 1">
+            <a:extLst>
+              <a:ext uri="{FF2B5EF4-FFF2-40B4-BE49-F238E27FC236}">
                 <a16:creationId xmlns:a16="http://schemas.microsoft.com/office/drawing/2014/main" id="{2D02D056-34B9-BE44-9797-EC766FAC4789}"/>
               </a:ext>
             </a:extLst>
@@ -12988,6 +14337,361 @@
     <p:extLst>
       <p:ext uri="{BB962C8B-B14F-4D97-AF65-F5344CB8AC3E}">
         <p14:creationId xmlns:p14="http://schemas.microsoft.com/office/powerpoint/2010/main" val="2532277239"/>
+      </p:ext>
+    </p:extLst>
+  </p:cSld>
+  <p:clrMapOvr>
+    <a:masterClrMapping/>
+  </p:clrMapOvr>
+</p:sld>
+</file>
+
+<file path=ppt/slides/slide32.xml><?xml version="1.0" encoding="utf-8"?>
+<p:sld xmlns:a="http://schemas.openxmlformats.org/drawingml/2006/main" xmlns:r="http://schemas.openxmlformats.org/officeDocument/2006/relationships" xmlns:p="http://schemas.openxmlformats.org/presentationml/2006/main">
+  <p:cSld>
+    <p:spTree>
+      <p:nvGrpSpPr>
+        <p:cNvPr id="1" name=""/>
+        <p:cNvGrpSpPr/>
+        <p:nvPr/>
+      </p:nvGrpSpPr>
+      <p:grpSpPr>
+        <a:xfrm>
+          <a:off x="0" y="0"/>
+          <a:ext cx="0" cy="0"/>
+          <a:chOff x="0" y="0"/>
+          <a:chExt cx="0" cy="0"/>
+        </a:xfrm>
+      </p:grpSpPr>
+      <p:sp>
+        <p:nvSpPr>
+          <p:cNvPr id="2" name="Title 1">
+            <a:extLst>
+              <a:ext uri="{FF2B5EF4-FFF2-40B4-BE49-F238E27FC236}">
+                <a16:creationId xmlns:a16="http://schemas.microsoft.com/office/drawing/2014/main" id="{AE26C2E0-EBD9-B741-A7F5-EB585CDC0F20}"/>
+              </a:ext>
+            </a:extLst>
+          </p:cNvPr>
+          <p:cNvSpPr>
+            <a:spLocks noGrp="1"/>
+          </p:cNvSpPr>
+          <p:nvPr>
+            <p:ph type="title"/>
+          </p:nvPr>
+        </p:nvSpPr>
+        <p:spPr/>
+        <p:txBody>
+          <a:bodyPr/>
+          <a:lstStyle/>
+          <a:p>
+            <a:r>
+              <a:rPr lang="en-US" dirty="0"/>
+              <a:t>Appendix</a:t>
+            </a:r>
+          </a:p>
+        </p:txBody>
+      </p:sp>
+      <p:sp>
+        <p:nvSpPr>
+          <p:cNvPr id="3" name="Content Placeholder 2">
+            <a:extLst>
+              <a:ext uri="{FF2B5EF4-FFF2-40B4-BE49-F238E27FC236}">
+                <a16:creationId xmlns:a16="http://schemas.microsoft.com/office/drawing/2014/main" id="{71D12C56-EF69-2F4A-838E-FCEE46319D05}"/>
+              </a:ext>
+            </a:extLst>
+          </p:cNvPr>
+          <p:cNvSpPr>
+            <a:spLocks noGrp="1"/>
+          </p:cNvSpPr>
+          <p:nvPr>
+            <p:ph idx="1"/>
+          </p:nvPr>
+        </p:nvSpPr>
+        <p:spPr/>
+        <p:txBody>
+          <a:bodyPr/>
+          <a:lstStyle/>
+          <a:p>
+            <a:r>
+              <a:rPr lang="en-US" dirty="0"/>
+              <a:t>Advanced topics</a:t>
+            </a:r>
+          </a:p>
+          <a:p>
+            <a:r>
+              <a:rPr lang="en-US" dirty="0"/>
+              <a:t>Miscellaneous</a:t>
+            </a:r>
+          </a:p>
+          <a:p>
+            <a:pPr marL="0" indent="0">
+              <a:buNone/>
+            </a:pPr>
+            <a:endParaRPr lang="en-US" dirty="0"/>
+          </a:p>
+        </p:txBody>
+      </p:sp>
+    </p:spTree>
+    <p:extLst>
+      <p:ext uri="{BB962C8B-B14F-4D97-AF65-F5344CB8AC3E}">
+        <p14:creationId xmlns:p14="http://schemas.microsoft.com/office/powerpoint/2010/main" val="1979448845"/>
+      </p:ext>
+    </p:extLst>
+  </p:cSld>
+  <p:clrMapOvr>
+    <a:masterClrMapping/>
+  </p:clrMapOvr>
+</p:sld>
+</file>
+
+<file path=ppt/slides/slide33.xml><?xml version="1.0" encoding="utf-8"?>
+<p:sld xmlns:a="http://schemas.openxmlformats.org/drawingml/2006/main" xmlns:r="http://schemas.openxmlformats.org/officeDocument/2006/relationships" xmlns:p="http://schemas.openxmlformats.org/presentationml/2006/main">
+  <p:cSld>
+    <p:spTree>
+      <p:nvGrpSpPr>
+        <p:cNvPr id="1" name=""/>
+        <p:cNvGrpSpPr/>
+        <p:nvPr/>
+      </p:nvGrpSpPr>
+      <p:grpSpPr>
+        <a:xfrm>
+          <a:off x="0" y="0"/>
+          <a:ext cx="0" cy="0"/>
+          <a:chOff x="0" y="0"/>
+          <a:chExt cx="0" cy="0"/>
+        </a:xfrm>
+      </p:grpSpPr>
+      <p:sp>
+        <p:nvSpPr>
+          <p:cNvPr id="2" name="Title 1">
+            <a:extLst>
+              <a:ext uri="{FF2B5EF4-FFF2-40B4-BE49-F238E27FC236}">
+                <a16:creationId xmlns:a16="http://schemas.microsoft.com/office/drawing/2014/main" id="{B16A69D2-C569-A745-A8DD-0A24B6AB7933}"/>
+              </a:ext>
+            </a:extLst>
+          </p:cNvPr>
+          <p:cNvSpPr>
+            <a:spLocks noGrp="1"/>
+          </p:cNvSpPr>
+          <p:nvPr>
+            <p:ph type="title"/>
+          </p:nvPr>
+        </p:nvSpPr>
+        <p:spPr/>
+        <p:txBody>
+          <a:bodyPr/>
+          <a:lstStyle/>
+          <a:p>
+            <a:r>
+              <a:rPr lang="en-US" dirty="0"/>
+              <a:t>Sharing Data Between Callbacks</a:t>
+            </a:r>
+          </a:p>
+        </p:txBody>
+      </p:sp>
+      <p:sp>
+        <p:nvSpPr>
+          <p:cNvPr id="3" name="Content Placeholder 2">
+            <a:extLst>
+              <a:ext uri="{FF2B5EF4-FFF2-40B4-BE49-F238E27FC236}">
+                <a16:creationId xmlns:a16="http://schemas.microsoft.com/office/drawing/2014/main" id="{09CDAAB2-7D81-244D-8E3B-3E224FDF5D69}"/>
+              </a:ext>
+            </a:extLst>
+          </p:cNvPr>
+          <p:cNvSpPr>
+            <a:spLocks noGrp="1"/>
+          </p:cNvSpPr>
+          <p:nvPr>
+            <p:ph idx="1"/>
+          </p:nvPr>
+        </p:nvSpPr>
+        <p:spPr/>
+        <p:txBody>
+          <a:bodyPr>
+            <a:normAutofit/>
+          </a:bodyPr>
+          <a:lstStyle/>
+          <a:p>
+            <a:r>
+              <a:rPr lang="en-US" dirty="0"/>
+              <a:t>We know from earlier that we can’t share state with global variables but what if we have multiple callbacks that depend on expensive preprocessing?</a:t>
+            </a:r>
+          </a:p>
+          <a:p>
+            <a:endParaRPr lang="en-US" dirty="0"/>
+          </a:p>
+          <a:p>
+            <a:r>
+              <a:rPr lang="en-US" dirty="0"/>
+              <a:t>There are three options:</a:t>
+            </a:r>
+          </a:p>
+          <a:p>
+            <a:pPr lvl="1">
+              <a:buFont typeface="+mj-lt"/>
+              <a:buAutoNum type="arabicPeriod"/>
+            </a:pPr>
+            <a:r>
+              <a:rPr lang="en-US" dirty="0"/>
+              <a:t>Store it in the user’s browser session</a:t>
+            </a:r>
+          </a:p>
+          <a:p>
+            <a:pPr lvl="1">
+              <a:buFont typeface="+mj-lt"/>
+              <a:buAutoNum type="arabicPeriod"/>
+            </a:pPr>
+            <a:r>
+              <a:rPr lang="en-US" dirty="0"/>
+              <a:t>Store it on the disk</a:t>
+            </a:r>
+          </a:p>
+          <a:p>
+            <a:pPr lvl="1">
+              <a:buFont typeface="+mj-lt"/>
+              <a:buAutoNum type="arabicPeriod"/>
+            </a:pPr>
+            <a:r>
+              <a:rPr lang="en-US" dirty="0"/>
+              <a:t>Store in shared memory space like </a:t>
+            </a:r>
+            <a:r>
+              <a:rPr lang="en-US" dirty="0" err="1"/>
+              <a:t>Redis</a:t>
+            </a:r>
+            <a:endParaRPr lang="en-US" dirty="0"/>
+          </a:p>
+          <a:p>
+            <a:pPr marL="457200" lvl="1" indent="0">
+              <a:buNone/>
+            </a:pPr>
+            <a:endParaRPr lang="en-US" dirty="0"/>
+          </a:p>
+          <a:p>
+            <a:r>
+              <a:rPr lang="en-US" dirty="0">
+                <a:hlinkClick r:id="rId2"/>
+              </a:rPr>
+              <a:t>https://dash.plot.ly/sharing-data-between-callbacks</a:t>
+            </a:r>
+            <a:endParaRPr lang="en-US" dirty="0"/>
+          </a:p>
+          <a:p>
+            <a:endParaRPr lang="en-US" dirty="0"/>
+          </a:p>
+          <a:p>
+            <a:pPr marL="457200" lvl="1" indent="0">
+              <a:buNone/>
+            </a:pPr>
+            <a:endParaRPr lang="en-US" dirty="0"/>
+          </a:p>
+          <a:p>
+            <a:pPr lvl="1">
+              <a:buFont typeface="+mj-lt"/>
+              <a:buAutoNum type="arabicPeriod"/>
+            </a:pPr>
+            <a:endParaRPr lang="en-US" dirty="0"/>
+          </a:p>
+        </p:txBody>
+      </p:sp>
+    </p:spTree>
+    <p:extLst>
+      <p:ext uri="{BB962C8B-B14F-4D97-AF65-F5344CB8AC3E}">
+        <p14:creationId xmlns:p14="http://schemas.microsoft.com/office/powerpoint/2010/main" val="947561275"/>
+      </p:ext>
+    </p:extLst>
+  </p:cSld>
+  <p:clrMapOvr>
+    <a:masterClrMapping/>
+  </p:clrMapOvr>
+</p:sld>
+</file>
+
+<file path=ppt/slides/slide34.xml><?xml version="1.0" encoding="utf-8"?>
+<p:sld xmlns:a="http://schemas.openxmlformats.org/drawingml/2006/main" xmlns:r="http://schemas.openxmlformats.org/officeDocument/2006/relationships" xmlns:p="http://schemas.openxmlformats.org/presentationml/2006/main">
+  <p:cSld>
+    <p:spTree>
+      <p:nvGrpSpPr>
+        <p:cNvPr id="1" name=""/>
+        <p:cNvGrpSpPr/>
+        <p:nvPr/>
+      </p:nvGrpSpPr>
+      <p:grpSpPr>
+        <a:xfrm>
+          <a:off x="0" y="0"/>
+          <a:ext cx="0" cy="0"/>
+          <a:chOff x="0" y="0"/>
+          <a:chExt cx="0" cy="0"/>
+        </a:xfrm>
+      </p:grpSpPr>
+      <p:sp>
+        <p:nvSpPr>
+          <p:cNvPr id="2" name="Title 1">
+            <a:extLst>
+              <a:ext uri="{FF2B5EF4-FFF2-40B4-BE49-F238E27FC236}">
+                <a16:creationId xmlns:a16="http://schemas.microsoft.com/office/drawing/2014/main" id="{B14A6EC7-4813-9643-8258-F824400A49A4}"/>
+              </a:ext>
+            </a:extLst>
+          </p:cNvPr>
+          <p:cNvSpPr>
+            <a:spLocks noGrp="1"/>
+          </p:cNvSpPr>
+          <p:nvPr>
+            <p:ph type="title"/>
+          </p:nvPr>
+        </p:nvSpPr>
+        <p:spPr/>
+        <p:txBody>
+          <a:bodyPr/>
+          <a:lstStyle/>
+          <a:p>
+            <a:r>
+              <a:rPr lang="en-US" dirty="0"/>
+              <a:t>Assignment 10 (Final Challenge)</a:t>
+            </a:r>
+          </a:p>
+        </p:txBody>
+      </p:sp>
+      <p:sp>
+        <p:nvSpPr>
+          <p:cNvPr id="3" name="Content Placeholder 2">
+            <a:extLst>
+              <a:ext uri="{FF2B5EF4-FFF2-40B4-BE49-F238E27FC236}">
+                <a16:creationId xmlns:a16="http://schemas.microsoft.com/office/drawing/2014/main" id="{E3CCDB5F-1C82-EC49-B95F-4C7310374CE3}"/>
+              </a:ext>
+            </a:extLst>
+          </p:cNvPr>
+          <p:cNvSpPr>
+            <a:spLocks noGrp="1"/>
+          </p:cNvSpPr>
+          <p:nvPr>
+            <p:ph idx="1"/>
+          </p:nvPr>
+        </p:nvSpPr>
+        <p:spPr/>
+        <p:txBody>
+          <a:bodyPr/>
+          <a:lstStyle/>
+          <a:p>
+            <a:r>
+              <a:rPr lang="en-US" dirty="0"/>
+              <a:t>Open </a:t>
+            </a:r>
+            <a:r>
+              <a:rPr lang="en-US" dirty="0" err="1"/>
+              <a:t>final_challenge.py</a:t>
+            </a:r>
+            <a:r>
+              <a:rPr lang="en-US" dirty="0"/>
+              <a:t> and read the instructions at the top</a:t>
+            </a:r>
+          </a:p>
+        </p:txBody>
+      </p:sp>
+    </p:spTree>
+    <p:extLst>
+      <p:ext uri="{BB962C8B-B14F-4D97-AF65-F5344CB8AC3E}">
+        <p14:creationId xmlns:p14="http://schemas.microsoft.com/office/powerpoint/2010/main" val="3294668775"/>
       </p:ext>
     </p:extLst>
   </p:cSld>
@@ -13061,7 +14765,9 @@
         </p:nvSpPr>
         <p:spPr/>
         <p:txBody>
-          <a:bodyPr/>
+          <a:bodyPr>
+            <a:normAutofit/>
+          </a:bodyPr>
           <a:lstStyle/>
           <a:p>
             <a:r>
@@ -13094,6 +14800,48 @@
               <a:rPr lang="en-US" dirty="0"/>
               <a:t>Dash supports authentication</a:t>
             </a:r>
+          </a:p>
+          <a:p>
+            <a:pPr marL="0" indent="0">
+              <a:buNone/>
+            </a:pPr>
+            <a:endParaRPr lang="en-US" dirty="0"/>
+          </a:p>
+          <a:p>
+            <a:pPr marL="0" indent="0">
+              <a:buNone/>
+            </a:pPr>
+            <a:endParaRPr lang="en-US" dirty="0"/>
+          </a:p>
+          <a:p>
+            <a:pPr marL="0" indent="0">
+              <a:buNone/>
+            </a:pPr>
+            <a:endParaRPr lang="en-US" dirty="0"/>
+          </a:p>
+          <a:p>
+            <a:pPr marL="0" indent="0">
+              <a:buNone/>
+            </a:pPr>
+            <a:r>
+              <a:rPr lang="en-US" dirty="0">
+                <a:hlinkClick r:id="rId2"/>
+              </a:rPr>
+              <a:t>https://dash.plot.ly/deployment</a:t>
+            </a:r>
+            <a:endParaRPr lang="en-US" dirty="0"/>
+          </a:p>
+          <a:p>
+            <a:pPr marL="0" indent="0">
+              <a:buNone/>
+            </a:pPr>
+            <a:r>
+              <a:rPr lang="en-US" dirty="0">
+                <a:hlinkClick r:id="rId3"/>
+              </a:rPr>
+              <a:t>https://dash.plot.ly/authentication</a:t>
+            </a:r>
+            <a:endParaRPr lang="en-US" dirty="0"/>
           </a:p>
         </p:txBody>
       </p:sp>

</xml_diff>